<commit_message>
Responsive Images, updated presentation
</commit_message>
<xml_diff>
--- a/docs/FIn 422 Case Presentation - v.FINAL.pptx
+++ b/docs/FIn 422 Case Presentation - v.FINAL.pptx
@@ -27,6 +27,10 @@
     <p:sldId id="274" r:id="rId21"/>
     <p:sldId id="278" r:id="rId22"/>
     <p:sldId id="279" r:id="rId23"/>
+    <p:sldId id="282" r:id="rId24"/>
+    <p:sldId id="283" r:id="rId25"/>
+    <p:sldId id="284" r:id="rId26"/>
+    <p:sldId id="285" r:id="rId27"/>
   </p:sldIdLst>
   <p:sldSz cx="12192000" cy="6858000"/>
   <p:notesSz cx="6858000" cy="9144000"/>
@@ -127,13 +131,13 @@
   </p:defaultTextStyle>
   <p:extLst>
     <p:ext uri="{EFAFB233-063F-42B5-8137-9DF3F51BA10A}">
-      <p15:sldGuideLst xmlns="" xmlns:p15="http://schemas.microsoft.com/office/powerpoint/2012/main">
+      <p15:sldGuideLst xmlns:p15="http://schemas.microsoft.com/office/powerpoint/2012/main">
         <p15:guide id="1" pos="3816" userDrawn="1">
           <p15:clr>
             <a:srgbClr val="A4A3A4"/>
           </p15:clr>
         </p15:guide>
-        <p15:guide id="2" orient="horz" pos="2160" userDrawn="1">
+        <p15:guide id="2" orient="horz" pos="2112" userDrawn="1">
           <p15:clr>
             <a:srgbClr val="A4A3A4"/>
           </p15:clr>
@@ -1134,13 +1138,6 @@
         </dgm:presLayoutVars>
       </dgm:prSet>
       <dgm:spPr/>
-      <dgm:t>
-        <a:bodyPr/>
-        <a:lstStyle/>
-        <a:p>
-          <a:endParaRPr lang="en-CA"/>
-        </a:p>
-      </dgm:t>
     </dgm:pt>
     <dgm:pt modelId="{F570BCB9-C74C-4948-8933-C7BA5AFBBF27}" type="pres">
       <dgm:prSet presAssocID="{761BBDC2-E636-4EC0-84E6-A05E6DC71B0A}" presName="parentText1" presStyleLbl="node1" presStyleIdx="0" presStyleCnt="3">
@@ -1151,13 +1148,6 @@
         </dgm:presLayoutVars>
       </dgm:prSet>
       <dgm:spPr/>
-      <dgm:t>
-        <a:bodyPr/>
-        <a:lstStyle/>
-        <a:p>
-          <a:endParaRPr lang="en-CA"/>
-        </a:p>
-      </dgm:t>
     </dgm:pt>
     <dgm:pt modelId="{54AEA023-33E2-4863-A16F-43B99DEBD0A5}" type="pres">
       <dgm:prSet presAssocID="{761BBDC2-E636-4EC0-84E6-A05E6DC71B0A}" presName="childText1" presStyleLbl="solidAlignAcc1" presStyleIdx="0" presStyleCnt="3">
@@ -1168,13 +1158,6 @@
         </dgm:presLayoutVars>
       </dgm:prSet>
       <dgm:spPr/>
-      <dgm:t>
-        <a:bodyPr/>
-        <a:lstStyle/>
-        <a:p>
-          <a:endParaRPr lang="en-CA"/>
-        </a:p>
-      </dgm:t>
     </dgm:pt>
     <dgm:pt modelId="{BF9CAFB6-4BF7-47FC-BF3D-BD15D2EF64D8}" type="pres">
       <dgm:prSet presAssocID="{92D9CD48-D677-49DC-8D2E-F00707860786}" presName="parentText2" presStyleLbl="node1" presStyleIdx="1" presStyleCnt="3">
@@ -1185,13 +1168,6 @@
         </dgm:presLayoutVars>
       </dgm:prSet>
       <dgm:spPr/>
-      <dgm:t>
-        <a:bodyPr/>
-        <a:lstStyle/>
-        <a:p>
-          <a:endParaRPr lang="en-CA"/>
-        </a:p>
-      </dgm:t>
     </dgm:pt>
     <dgm:pt modelId="{85E818D2-CF9B-49C3-8FEE-A403A68EDBD2}" type="pres">
       <dgm:prSet presAssocID="{92D9CD48-D677-49DC-8D2E-F00707860786}" presName="childText2" presStyleLbl="solidAlignAcc1" presStyleIdx="1" presStyleCnt="3">
@@ -1202,13 +1178,6 @@
         </dgm:presLayoutVars>
       </dgm:prSet>
       <dgm:spPr/>
-      <dgm:t>
-        <a:bodyPr/>
-        <a:lstStyle/>
-        <a:p>
-          <a:endParaRPr lang="en-CA"/>
-        </a:p>
-      </dgm:t>
     </dgm:pt>
     <dgm:pt modelId="{906259F6-9AF5-4310-8472-E5AA5F4457C9}" type="pres">
       <dgm:prSet presAssocID="{2AD3396C-72C7-463D-B600-5F76760756EA}" presName="parentText3" presStyleLbl="node1" presStyleIdx="2" presStyleCnt="3">
@@ -1219,13 +1188,6 @@
         </dgm:presLayoutVars>
       </dgm:prSet>
       <dgm:spPr/>
-      <dgm:t>
-        <a:bodyPr/>
-        <a:lstStyle/>
-        <a:p>
-          <a:endParaRPr lang="en-CA"/>
-        </a:p>
-      </dgm:t>
     </dgm:pt>
     <dgm:pt modelId="{0C7923F1-500C-4E19-A376-43597B3159FF}" type="pres">
       <dgm:prSet presAssocID="{2AD3396C-72C7-463D-B600-5F76760756EA}" presName="childText3" presStyleLbl="solidAlignAcc1" presStyleIdx="2" presStyleCnt="3">
@@ -1236,13 +1198,6 @@
         </dgm:presLayoutVars>
       </dgm:prSet>
       <dgm:spPr/>
-      <dgm:t>
-        <a:bodyPr/>
-        <a:lstStyle/>
-        <a:p>
-          <a:endParaRPr lang="en-CA"/>
-        </a:p>
-      </dgm:t>
     </dgm:pt>
   </dgm:ptLst>
   <dgm:cxnLst>
@@ -1342,7 +1297,7 @@
         </a:bodyPr>
         <a:lstStyle/>
         <a:p>
-          <a:pPr lvl="0" algn="l" defTabSz="977900">
+          <a:pPr marL="0" lvl="0" indent="0" algn="l" defTabSz="977900">
             <a:lnSpc>
               <a:spcPct val="90000"/>
             </a:lnSpc>
@@ -1352,6 +1307,7 @@
             <a:spcAft>
               <a:spcPct val="35000"/>
             </a:spcAft>
+            <a:buNone/>
           </a:pPr>
           <a:endParaRPr lang="en-US" sz="2200" kern="1200"/>
         </a:p>
@@ -1414,7 +1370,7 @@
         </a:bodyPr>
         <a:lstStyle/>
         <a:p>
-          <a:pPr lvl="0" algn="l" defTabSz="1911350">
+          <a:pPr marL="0" lvl="0" indent="0" algn="l" defTabSz="1911350">
             <a:lnSpc>
               <a:spcPct val="90000"/>
             </a:lnSpc>
@@ -1424,6 +1380,7 @@
             <a:spcAft>
               <a:spcPct val="35000"/>
             </a:spcAft>
+            <a:buNone/>
           </a:pPr>
           <a:r>
             <a:rPr lang="en-US" sz="4300" b="1" kern="1200" dirty="0">
@@ -1498,7 +1455,7 @@
         </a:bodyPr>
         <a:lstStyle/>
         <a:p>
-          <a:pPr lvl="0" algn="l" defTabSz="977900">
+          <a:pPr marL="0" lvl="0" indent="0" algn="l" defTabSz="977900">
             <a:lnSpc>
               <a:spcPct val="90000"/>
             </a:lnSpc>
@@ -1508,6 +1465,7 @@
             <a:spcAft>
               <a:spcPct val="35000"/>
             </a:spcAft>
+            <a:buNone/>
           </a:pPr>
           <a:endParaRPr lang="en-US" sz="2200" kern="1200"/>
         </a:p>
@@ -1570,7 +1528,7 @@
         </a:bodyPr>
         <a:lstStyle/>
         <a:p>
-          <a:pPr lvl="0" algn="l" defTabSz="1911350">
+          <a:pPr marL="0" lvl="0" indent="0" algn="l" defTabSz="1911350">
             <a:lnSpc>
               <a:spcPct val="90000"/>
             </a:lnSpc>
@@ -1580,6 +1538,7 @@
             <a:spcAft>
               <a:spcPct val="35000"/>
             </a:spcAft>
+            <a:buNone/>
           </a:pPr>
           <a:r>
             <a:rPr lang="en-US" sz="4300" b="1" kern="1200" dirty="0">
@@ -1654,7 +1613,7 @@
         </a:bodyPr>
         <a:lstStyle/>
         <a:p>
-          <a:pPr lvl="0" algn="l" defTabSz="977900">
+          <a:pPr marL="0" lvl="0" indent="0" algn="l" defTabSz="977900">
             <a:lnSpc>
               <a:spcPct val="90000"/>
             </a:lnSpc>
@@ -1664,6 +1623,7 @@
             <a:spcAft>
               <a:spcPct val="35000"/>
             </a:spcAft>
+            <a:buNone/>
           </a:pPr>
           <a:endParaRPr lang="en-US" sz="2200" kern="1200"/>
         </a:p>
@@ -1726,7 +1686,7 @@
         </a:bodyPr>
         <a:lstStyle/>
         <a:p>
-          <a:pPr lvl="0" algn="l" defTabSz="1911350">
+          <a:pPr marL="0" lvl="0" indent="0" algn="l" defTabSz="1911350">
             <a:lnSpc>
               <a:spcPct val="90000"/>
             </a:lnSpc>
@@ -1736,6 +1696,7 @@
             <a:spcAft>
               <a:spcPct val="35000"/>
             </a:spcAft>
+            <a:buNone/>
           </a:pPr>
           <a:r>
             <a:rPr lang="en-US" sz="4300" b="1" kern="1200" dirty="0">
@@ -4159,7 +4120,7 @@
           <a:p>
             <a:fld id="{AAAF79F7-3A14-4081-A2D3-394037DFCE3B}" type="datetimeFigureOut">
               <a:rPr lang="en-US" smtClean="0"/>
-              <a:t>4/2/2016</a:t>
+              <a:t>4/3/2016</a:t>
             </a:fld>
             <a:endParaRPr lang="en-US"/>
           </a:p>
@@ -4339,7 +4300,7 @@
           <a:p>
             <a:fld id="{AAAF79F7-3A14-4081-A2D3-394037DFCE3B}" type="datetimeFigureOut">
               <a:rPr lang="en-US" smtClean="0"/>
-              <a:t>4/2/2016</a:t>
+              <a:t>4/3/2016</a:t>
             </a:fld>
             <a:endParaRPr lang="en-US"/>
           </a:p>
@@ -4529,7 +4490,7 @@
           <a:p>
             <a:fld id="{AAAF79F7-3A14-4081-A2D3-394037DFCE3B}" type="datetimeFigureOut">
               <a:rPr lang="en-US" smtClean="0"/>
-              <a:t>4/2/2016</a:t>
+              <a:t>4/3/2016</a:t>
             </a:fld>
             <a:endParaRPr lang="en-US"/>
           </a:p>
@@ -4709,7 +4670,7 @@
           <a:p>
             <a:fld id="{AAAF79F7-3A14-4081-A2D3-394037DFCE3B}" type="datetimeFigureOut">
               <a:rPr lang="en-US" smtClean="0"/>
-              <a:t>4/2/2016</a:t>
+              <a:t>4/3/2016</a:t>
             </a:fld>
             <a:endParaRPr lang="en-US"/>
           </a:p>
@@ -4966,7 +4927,7 @@
           <a:p>
             <a:fld id="{AAAF79F7-3A14-4081-A2D3-394037DFCE3B}" type="datetimeFigureOut">
               <a:rPr lang="en-US" smtClean="0"/>
-              <a:t>4/2/2016</a:t>
+              <a:t>4/3/2016</a:t>
             </a:fld>
             <a:endParaRPr lang="en-US"/>
           </a:p>
@@ -5207,7 +5168,7 @@
           <a:p>
             <a:fld id="{AAAF79F7-3A14-4081-A2D3-394037DFCE3B}" type="datetimeFigureOut">
               <a:rPr lang="en-US" smtClean="0"/>
-              <a:t>4/2/2016</a:t>
+              <a:t>4/3/2016</a:t>
             </a:fld>
             <a:endParaRPr lang="en-US"/>
           </a:p>
@@ -5583,7 +5544,7 @@
           <a:p>
             <a:fld id="{AAAF79F7-3A14-4081-A2D3-394037DFCE3B}" type="datetimeFigureOut">
               <a:rPr lang="en-US" smtClean="0"/>
-              <a:t>4/2/2016</a:t>
+              <a:t>4/3/2016</a:t>
             </a:fld>
             <a:endParaRPr lang="en-US"/>
           </a:p>
@@ -5712,7 +5673,7 @@
           <a:p>
             <a:fld id="{AAAF79F7-3A14-4081-A2D3-394037DFCE3B}" type="datetimeFigureOut">
               <a:rPr lang="en-US" smtClean="0"/>
-              <a:t>4/2/2016</a:t>
+              <a:t>4/3/2016</a:t>
             </a:fld>
             <a:endParaRPr lang="en-US"/>
           </a:p>
@@ -5819,7 +5780,7 @@
           <a:p>
             <a:fld id="{AAAF79F7-3A14-4081-A2D3-394037DFCE3B}" type="datetimeFigureOut">
               <a:rPr lang="en-US" smtClean="0"/>
-              <a:t>4/2/2016</a:t>
+              <a:t>4/3/2016</a:t>
             </a:fld>
             <a:endParaRPr lang="en-US"/>
           </a:p>
@@ -6106,7 +6067,7 @@
           <a:p>
             <a:fld id="{AAAF79F7-3A14-4081-A2D3-394037DFCE3B}" type="datetimeFigureOut">
               <a:rPr lang="en-US" smtClean="0"/>
-              <a:t>4/2/2016</a:t>
+              <a:t>4/3/2016</a:t>
             </a:fld>
             <a:endParaRPr lang="en-US"/>
           </a:p>
@@ -6370,7 +6331,7 @@
           <a:p>
             <a:fld id="{AAAF79F7-3A14-4081-A2D3-394037DFCE3B}" type="datetimeFigureOut">
               <a:rPr lang="en-US" smtClean="0"/>
-              <a:t>4/2/2016</a:t>
+              <a:t>4/3/2016</a:t>
             </a:fld>
             <a:endParaRPr lang="en-US"/>
           </a:p>
@@ -6593,7 +6554,7 @@
           <a:p>
             <a:fld id="{AAAF79F7-3A14-4081-A2D3-394037DFCE3B}" type="datetimeFigureOut">
               <a:rPr lang="en-US" smtClean="0"/>
-              <a:t>4/2/2016</a:t>
+              <a:t>4/3/2016</a:t>
             </a:fld>
             <a:endParaRPr lang="en-US"/>
           </a:p>
@@ -7120,20 +7081,12 @@
           </a:p>
           <a:p>
             <a:r>
-              <a:rPr lang="en-US" sz="3200" b="1" dirty="0" err="1">
+              <a:rPr lang="en-US" sz="3200" b="1" dirty="0">
                 <a:solidFill>
                   <a:schemeClr val="bg1"/>
                 </a:solidFill>
               </a:rPr>
-              <a:t>Wascana</a:t>
-            </a:r>
-            <a:r>
-              <a:rPr lang="en-US" sz="3200" b="1" dirty="0">
-                <a:solidFill>
-                  <a:schemeClr val="bg1"/>
-                </a:solidFill>
-              </a:rPr>
-              <a:t> Energy Inc. </a:t>
+              <a:t>Wascana Energy Inc. </a:t>
             </a:r>
           </a:p>
         </p:txBody>
@@ -7255,13 +7208,6 @@
       </p:transition>
     </mc:Fallback>
   </mc:AlternateContent>
-  <p:timing>
-    <p:tnLst>
-      <p:par>
-        <p:cTn id="1" dur="indefinite" restart="never" nodeType="tmRoot"/>
-      </p:par>
-    </p:tnLst>
-  </p:timing>
 </p:sld>
 </file>
 
@@ -7315,6 +7261,45 @@
           </a:p>
         </p:txBody>
       </p:sp>
+      <p:sp>
+        <p:nvSpPr>
+          <p:cNvPr id="3" name="TextBox 2"/>
+          <p:cNvSpPr txBox="1"/>
+          <p:nvPr/>
+        </p:nvSpPr>
+        <p:spPr>
+          <a:xfrm>
+            <a:off x="111210" y="6275529"/>
+            <a:ext cx="7158681" cy="369332"/>
+          </a:xfrm>
+          <a:prstGeom prst="rect">
+            <a:avLst/>
+          </a:prstGeom>
+          <a:noFill/>
+        </p:spPr>
+        <p:txBody>
+          <a:bodyPr wrap="square" rtlCol="0">
+            <a:spAutoFit/>
+          </a:bodyPr>
+          <a:lstStyle/>
+          <a:p>
+            <a:r>
+              <a:rPr lang="en-US" b="1" dirty="0">
+                <a:solidFill>
+                  <a:schemeClr val="accent1"/>
+                </a:solidFill>
+                <a:hlinkClick r:id="rId2" action="ppaction://hlinksldjump"/>
+              </a:rPr>
+              <a:t>QA</a:t>
+            </a:r>
+            <a:endParaRPr lang="en-US" b="1" dirty="0">
+              <a:solidFill>
+                <a:schemeClr val="accent1"/>
+              </a:solidFill>
+            </a:endParaRPr>
+          </a:p>
+        </p:txBody>
+      </p:sp>
     </p:spTree>
     <p:extLst>
       <p:ext uri="{BB962C8B-B14F-4D97-AF65-F5344CB8AC3E}">
@@ -7337,13 +7322,6 @@
       </p:transition>
     </mc:Fallback>
   </mc:AlternateContent>
-  <p:timing>
-    <p:tnLst>
-      <p:par>
-        <p:cTn id="1" dur="indefinite" restart="never" nodeType="tmRoot"/>
-      </p:par>
-    </p:tnLst>
-  </p:timing>
 </p:sld>
 </file>
 
@@ -7461,13 +7439,13 @@
           <p:nvPr>
             <p:extLst>
               <p:ext uri="{D42A27DB-BD31-4B8C-83A1-F6EECF244321}">
-                <p14:modId xmlns:p14="http://schemas.microsoft.com/office/powerpoint/2010/main" val="2328210560"/>
+                <p14:modId xmlns:p14="http://schemas.microsoft.com/office/powerpoint/2010/main" val="666038524"/>
               </p:ext>
             </p:extLst>
           </p:nvPr>
         </p:nvGraphicFramePr>
         <p:xfrm>
-          <a:off x="226398" y="93785"/>
+          <a:off x="765660" y="93785"/>
           <a:ext cx="10636988" cy="3818735"/>
         </p:xfrm>
         <a:graphic>
@@ -7477,14 +7455,62 @@
                 <a:tableStyleId>{5C22544A-7EE6-4342-B048-85BDC9FD1C3A}</a:tableStyleId>
               </a:tblPr>
               <a:tblGrid>
-                <a:gridCol w="1601177"/>
-                <a:gridCol w="800589"/>
-                <a:gridCol w="1713761"/>
-                <a:gridCol w="800589"/>
-                <a:gridCol w="800589"/>
-                <a:gridCol w="1667893"/>
-                <a:gridCol w="1484424"/>
-                <a:gridCol w="1767966"/>
+                <a:gridCol w="1601177">
+                  <a:extLst>
+                    <a:ext uri="{9D8B030D-6E8A-4147-A177-3AD203B41FA5}">
+                      <a16:colId xmlns:a16="http://schemas.microsoft.com/office/drawing/2014/main" val="20000"/>
+                    </a:ext>
+                  </a:extLst>
+                </a:gridCol>
+                <a:gridCol w="800589">
+                  <a:extLst>
+                    <a:ext uri="{9D8B030D-6E8A-4147-A177-3AD203B41FA5}">
+                      <a16:colId xmlns:a16="http://schemas.microsoft.com/office/drawing/2014/main" val="20001"/>
+                    </a:ext>
+                  </a:extLst>
+                </a:gridCol>
+                <a:gridCol w="1713761">
+                  <a:extLst>
+                    <a:ext uri="{9D8B030D-6E8A-4147-A177-3AD203B41FA5}">
+                      <a16:colId xmlns:a16="http://schemas.microsoft.com/office/drawing/2014/main" val="20002"/>
+                    </a:ext>
+                  </a:extLst>
+                </a:gridCol>
+                <a:gridCol w="800589">
+                  <a:extLst>
+                    <a:ext uri="{9D8B030D-6E8A-4147-A177-3AD203B41FA5}">
+                      <a16:colId xmlns:a16="http://schemas.microsoft.com/office/drawing/2014/main" val="20003"/>
+                    </a:ext>
+                  </a:extLst>
+                </a:gridCol>
+                <a:gridCol w="800589">
+                  <a:extLst>
+                    <a:ext uri="{9D8B030D-6E8A-4147-A177-3AD203B41FA5}">
+                      <a16:colId xmlns:a16="http://schemas.microsoft.com/office/drawing/2014/main" val="20004"/>
+                    </a:ext>
+                  </a:extLst>
+                </a:gridCol>
+                <a:gridCol w="1667893">
+                  <a:extLst>
+                    <a:ext uri="{9D8B030D-6E8A-4147-A177-3AD203B41FA5}">
+                      <a16:colId xmlns:a16="http://schemas.microsoft.com/office/drawing/2014/main" val="20005"/>
+                    </a:ext>
+                  </a:extLst>
+                </a:gridCol>
+                <a:gridCol w="1484424">
+                  <a:extLst>
+                    <a:ext uri="{9D8B030D-6E8A-4147-A177-3AD203B41FA5}">
+                      <a16:colId xmlns:a16="http://schemas.microsoft.com/office/drawing/2014/main" val="20006"/>
+                    </a:ext>
+                  </a:extLst>
+                </a:gridCol>
+                <a:gridCol w="1767966">
+                  <a:extLst>
+                    <a:ext uri="{9D8B030D-6E8A-4147-A177-3AD203B41FA5}">
+                      <a16:colId xmlns:a16="http://schemas.microsoft.com/office/drawing/2014/main" val="20007"/>
+                    </a:ext>
+                  </a:extLst>
+                </a:gridCol>
               </a:tblGrid>
               <a:tr h="245692">
                 <a:tc gridSpan="3">
@@ -7675,6 +7701,11 @@
                     <a:noFill/>
                   </a:tcPr>
                 </a:tc>
+                <a:extLst>
+                  <a:ext uri="{0D108BD9-81ED-4DB2-BD59-A6C34878D82A}">
+                    <a16:rowId xmlns:a16="http://schemas.microsoft.com/office/drawing/2014/main" val="10000"/>
+                  </a:ext>
+                </a:extLst>
               </a:tr>
               <a:tr h="541261">
                 <a:tc>
@@ -7774,22 +7805,13 @@
                           </a:solidFill>
                           <a:effectLst/>
                         </a:rPr>
-                        <a:t> </a:t>
-                      </a:r>
-                      <a:r>
-                        <a:rPr lang="en-CA" sz="1200" b="1" u="none" strike="noStrike" dirty="0" smtClean="0">
-                          <a:solidFill>
-                            <a:schemeClr val="accent1"/>
-                          </a:solidFill>
-                          <a:effectLst/>
-                        </a:rPr>
-                        <a:t>Price/</a:t>
+                        <a:t> Price/</a:t>
                       </a:r>
                     </a:p>
                     <a:p>
                       <a:pPr algn="l" fontAlgn="b"/>
                       <a:r>
-                        <a:rPr lang="en-CA" sz="1200" b="1" u="none" strike="noStrike" dirty="0" smtClean="0">
+                        <a:rPr lang="en-CA" sz="1200" b="1" u="none" strike="noStrike" dirty="0">
                           <a:solidFill>
                             <a:schemeClr val="accent1"/>
                           </a:solidFill>
@@ -7801,7 +7823,7 @@
                     <a:p>
                       <a:pPr algn="l" fontAlgn="b"/>
                       <a:r>
-                        <a:rPr lang="en-CA" sz="1200" b="1" u="none" strike="noStrike" dirty="0" smtClean="0">
+                        <a:rPr lang="en-CA" sz="1200" b="1" u="none" strike="noStrike" dirty="0">
                           <a:solidFill>
                             <a:schemeClr val="accent1"/>
                           </a:solidFill>
@@ -7828,22 +7850,13 @@
                           </a:solidFill>
                           <a:effectLst/>
                         </a:rPr>
-                        <a:t> </a:t>
-                      </a:r>
-                      <a:r>
-                        <a:rPr lang="en-CA" sz="1200" b="1" u="none" strike="noStrike" dirty="0" smtClean="0">
-                          <a:solidFill>
-                            <a:schemeClr val="accent1"/>
-                          </a:solidFill>
-                          <a:effectLst/>
-                        </a:rPr>
-                        <a:t>Price/</a:t>
+                        <a:t> Price/</a:t>
                       </a:r>
                     </a:p>
                     <a:p>
                       <a:pPr algn="l" fontAlgn="b"/>
                       <a:r>
-                        <a:rPr lang="en-CA" sz="1200" b="1" u="none" strike="noStrike" dirty="0" smtClean="0">
+                        <a:rPr lang="en-CA" sz="1200" b="1" u="none" strike="noStrike" dirty="0">
                           <a:solidFill>
                             <a:schemeClr val="accent1"/>
                           </a:solidFill>
@@ -7873,28 +7886,23 @@
                       <a:r>
                         <a:rPr lang="en-CA" sz="1200" b="1" u="none" strike="noStrike" dirty="0">
                           <a:solidFill>
-                            <a:schemeClr val="accent1"/>
+                            <a:schemeClr val="tx2">
+                              <a:lumMod val="75000"/>
+                            </a:schemeClr>
                           </a:solidFill>
                           <a:effectLst/>
                         </a:rPr>
-                        <a:t> </a:t>
-                      </a:r>
-                      <a:r>
-                        <a:rPr lang="en-CA" sz="1200" b="1" u="none" strike="noStrike" dirty="0" smtClean="0">
-                          <a:solidFill>
-                            <a:schemeClr val="accent1"/>
-                          </a:solidFill>
-                          <a:effectLst/>
-                        </a:rPr>
-                        <a:t>Debt BV/</a:t>
+                        <a:t> Debt BV/</a:t>
                       </a:r>
                     </a:p>
                     <a:p>
                       <a:pPr algn="l" fontAlgn="b"/>
                       <a:r>
-                        <a:rPr lang="en-US" sz="1200" b="1" i="0" u="none" strike="noStrike" dirty="0" smtClean="0">
+                        <a:rPr lang="en-US" sz="1200" b="1" i="0" u="none" strike="noStrike" dirty="0">
                           <a:solidFill>
-                            <a:schemeClr val="accent1"/>
+                            <a:schemeClr val="tx2">
+                              <a:lumMod val="75000"/>
+                            </a:schemeClr>
                           </a:solidFill>
                           <a:effectLst/>
                           <a:latin typeface="Calibri"/>
@@ -7905,9 +7913,11 @@
                     <a:p>
                       <a:pPr algn="l" fontAlgn="b"/>
                       <a:r>
-                        <a:rPr lang="en-US" sz="1200" b="1" i="0" u="none" strike="noStrike" dirty="0" smtClean="0">
+                        <a:rPr lang="en-US" sz="1200" b="1" i="0" u="none" strike="noStrike" dirty="0">
                           <a:solidFill>
-                            <a:schemeClr val="accent1"/>
+                            <a:schemeClr val="tx2">
+                              <a:lumMod val="75000"/>
+                            </a:schemeClr>
                           </a:solidFill>
                           <a:effectLst/>
                           <a:latin typeface="Calibri"/>
@@ -7916,7 +7926,9 @@
                       </a:r>
                       <a:endParaRPr lang="en-CA" sz="1200" b="1" i="0" u="none" strike="noStrike" dirty="0">
                         <a:solidFill>
-                          <a:schemeClr val="accent1"/>
+                          <a:schemeClr val="tx2">
+                            <a:lumMod val="75000"/>
+                          </a:schemeClr>
                         </a:solidFill>
                         <a:effectLst/>
                         <a:latin typeface="Calibri"/>
@@ -7934,9 +7946,11 @@
                     <a:p>
                       <a:pPr algn="l" fontAlgn="b"/>
                       <a:r>
-                        <a:rPr lang="en-CA" sz="1200" b="1" u="none" strike="noStrike" dirty="0" smtClean="0">
+                        <a:rPr lang="en-CA" sz="1200" b="1" u="none" strike="noStrike" dirty="0">
                           <a:solidFill>
-                            <a:schemeClr val="accent1"/>
+                            <a:schemeClr val="tx2">
+                              <a:lumMod val="75000"/>
+                            </a:schemeClr>
                           </a:solidFill>
                           <a:effectLst/>
                         </a:rPr>
@@ -7946,18 +7960,22 @@
                     <a:p>
                       <a:pPr algn="l" fontAlgn="b"/>
                       <a:r>
-                        <a:rPr lang="en-CA" sz="1200" b="1" u="none" strike="noStrike" dirty="0" smtClean="0">
+                        <a:rPr lang="en-CA" sz="1200" b="1" u="none" strike="noStrike" dirty="0">
                           <a:solidFill>
-                            <a:schemeClr val="accent1"/>
+                            <a:schemeClr val="tx2">
+                              <a:lumMod val="75000"/>
+                            </a:schemeClr>
                           </a:solidFill>
                           <a:effectLst/>
                         </a:rPr>
                         <a:t>BOE/D</a:t>
                       </a:r>
                       <a:r>
-                        <a:rPr lang="en-CA" sz="1200" b="1" u="none" strike="noStrike" baseline="0" dirty="0" smtClean="0">
+                        <a:rPr lang="en-CA" sz="1200" b="1" u="none" strike="noStrike" baseline="0" dirty="0">
                           <a:solidFill>
-                            <a:schemeClr val="accent1"/>
+                            <a:schemeClr val="tx2">
+                              <a:lumMod val="75000"/>
+                            </a:schemeClr>
                           </a:solidFill>
                           <a:effectLst/>
                         </a:rPr>
@@ -7967,9 +7985,11 @@
                     <a:p>
                       <a:pPr algn="l" fontAlgn="b"/>
                       <a:r>
-                        <a:rPr lang="en-CA" sz="1200" b="1" u="none" strike="noStrike" baseline="0" dirty="0" smtClean="0">
+                        <a:rPr lang="en-CA" sz="1200" b="1" u="none" strike="noStrike" baseline="0" dirty="0">
                           <a:solidFill>
-                            <a:schemeClr val="accent1"/>
+                            <a:schemeClr val="tx2">
+                              <a:lumMod val="75000"/>
+                            </a:schemeClr>
                           </a:solidFill>
                           <a:effectLst/>
                         </a:rPr>
@@ -7978,7 +7998,9 @@
                       <a:r>
                         <a:rPr lang="en-CA" sz="1200" b="1" u="none" strike="noStrike" dirty="0">
                           <a:solidFill>
-                            <a:schemeClr val="accent1"/>
+                            <a:schemeClr val="tx2">
+                              <a:lumMod val="75000"/>
+                            </a:schemeClr>
                           </a:solidFill>
                           <a:effectLst/>
                         </a:rPr>
@@ -7986,7 +8008,9 @@
                       </a:r>
                       <a:endParaRPr lang="en-CA" sz="1200" b="1" i="0" u="none" strike="noStrike" dirty="0">
                         <a:solidFill>
-                          <a:schemeClr val="accent1"/>
+                          <a:schemeClr val="tx2">
+                            <a:lumMod val="75000"/>
+                          </a:schemeClr>
                         </a:solidFill>
                         <a:effectLst/>
                         <a:latin typeface="Calibri"/>
@@ -8004,9 +8028,11 @@
                     <a:p>
                       <a:pPr algn="l" fontAlgn="b"/>
                       <a:r>
-                        <a:rPr lang="en-CA" sz="1200" b="1" u="none" strike="noStrike" dirty="0" smtClean="0">
+                        <a:rPr lang="en-CA" sz="1200" b="1" u="none" strike="noStrike" dirty="0">
                           <a:solidFill>
-                            <a:schemeClr val="accent1"/>
+                            <a:schemeClr val="tx2">
+                              <a:lumMod val="75000"/>
+                            </a:schemeClr>
                           </a:solidFill>
                           <a:effectLst/>
                         </a:rPr>
@@ -8016,44 +8042,43 @@
                     <a:p>
                       <a:pPr algn="l" fontAlgn="b"/>
                       <a:r>
-                        <a:rPr lang="en-CA" sz="1200" b="1" u="none" strike="noStrike" dirty="0" smtClean="0">
+                        <a:rPr lang="en-CA" sz="1200" b="1" u="none" strike="noStrike" dirty="0">
                           <a:solidFill>
-                            <a:schemeClr val="accent1"/>
+                            <a:schemeClr val="tx2">
+                              <a:lumMod val="75000"/>
+                            </a:schemeClr>
                           </a:solidFill>
                           <a:effectLst/>
                         </a:rPr>
                         <a:t>BOE</a:t>
                       </a:r>
                       <a:r>
-                        <a:rPr lang="en-CA" sz="1200" b="1" u="none" strike="noStrike" baseline="0" dirty="0" smtClean="0">
+                        <a:rPr lang="en-CA" sz="1200" b="1" u="none" strike="noStrike" baseline="0" dirty="0">
                           <a:solidFill>
-                            <a:schemeClr val="accent1"/>
+                            <a:schemeClr val="tx2">
+                              <a:lumMod val="75000"/>
+                            </a:schemeClr>
                           </a:solidFill>
                           <a:effectLst/>
                         </a:rPr>
                         <a:t> of Reserves</a:t>
                       </a:r>
                       <a:r>
-                        <a:rPr lang="en-CA" sz="1200" b="1" u="none" strike="noStrike" dirty="0" smtClean="0">
+                        <a:rPr lang="en-CA" sz="1200" b="1" u="none" strike="noStrike" dirty="0">
                           <a:solidFill>
-                            <a:schemeClr val="accent1"/>
+                            <a:schemeClr val="tx2">
+                              <a:lumMod val="75000"/>
+                            </a:schemeClr>
                           </a:solidFill>
                           <a:effectLst/>
                         </a:rPr>
-                        <a:t> </a:t>
-                      </a:r>
-                      <a:r>
-                        <a:rPr lang="en-CA" sz="1200" b="1" u="none" strike="noStrike" dirty="0">
-                          <a:solidFill>
-                            <a:schemeClr val="accent1"/>
-                          </a:solidFill>
-                          <a:effectLst/>
-                        </a:rPr>
-                        <a:t> </a:t>
+                        <a:t>  </a:t>
                       </a:r>
                       <a:endParaRPr lang="en-CA" sz="1200" b="1" i="0" u="none" strike="noStrike" dirty="0">
                         <a:solidFill>
-                          <a:schemeClr val="accent1"/>
+                          <a:schemeClr val="tx2">
+                            <a:lumMod val="75000"/>
+                          </a:schemeClr>
                         </a:solidFill>
                         <a:effectLst/>
                         <a:latin typeface="Calibri"/>
@@ -8064,6 +8089,11 @@
                     <a:noFill/>
                   </a:tcPr>
                 </a:tc>
+                <a:extLst>
+                  <a:ext uri="{0D108BD9-81ED-4DB2-BD59-A6C34878D82A}">
+                    <a16:rowId xmlns:a16="http://schemas.microsoft.com/office/drawing/2014/main" val="10001"/>
+                  </a:ext>
+                </a:extLst>
               </a:tr>
               <a:tr h="189431">
                 <a:tc>
@@ -8218,7 +8248,9 @@
                       <a:r>
                         <a:rPr lang="en-CA" sz="1200" b="1" u="none" strike="noStrike" dirty="0">
                           <a:solidFill>
-                            <a:schemeClr val="accent1"/>
+                            <a:schemeClr val="tx2">
+                              <a:lumMod val="75000"/>
+                            </a:schemeClr>
                           </a:solidFill>
                           <a:effectLst/>
                         </a:rPr>
@@ -8226,7 +8258,9 @@
                       </a:r>
                       <a:endParaRPr lang="en-CA" sz="1200" b="1" i="0" u="none" strike="noStrike" dirty="0">
                         <a:solidFill>
-                          <a:schemeClr val="accent1"/>
+                          <a:schemeClr val="tx2">
+                            <a:lumMod val="75000"/>
+                          </a:schemeClr>
                         </a:solidFill>
                         <a:effectLst/>
                         <a:latin typeface="Calibri"/>
@@ -8246,7 +8280,9 @@
                       <a:r>
                         <a:rPr lang="en-CA" sz="1200" b="1" u="none" strike="noStrike" dirty="0">
                           <a:solidFill>
-                            <a:schemeClr val="accent1"/>
+                            <a:schemeClr val="tx2">
+                              <a:lumMod val="75000"/>
+                            </a:schemeClr>
                           </a:solidFill>
                           <a:effectLst/>
                         </a:rPr>
@@ -8254,7 +8290,9 @@
                       </a:r>
                       <a:endParaRPr lang="en-CA" sz="1200" b="1" i="0" u="none" strike="noStrike" dirty="0">
                         <a:solidFill>
-                          <a:schemeClr val="accent1"/>
+                          <a:schemeClr val="tx2">
+                            <a:lumMod val="75000"/>
+                          </a:schemeClr>
                         </a:solidFill>
                         <a:effectLst/>
                         <a:latin typeface="Calibri"/>
@@ -8274,7 +8312,9 @@
                       <a:r>
                         <a:rPr lang="en-CA" sz="1200" b="1" u="none" strike="noStrike" dirty="0">
                           <a:solidFill>
-                            <a:schemeClr val="accent1"/>
+                            <a:schemeClr val="tx2">
+                              <a:lumMod val="75000"/>
+                            </a:schemeClr>
                           </a:solidFill>
                           <a:effectLst/>
                         </a:rPr>
@@ -8282,7 +8322,9 @@
                       </a:r>
                       <a:endParaRPr lang="en-CA" sz="1200" b="1" i="0" u="none" strike="noStrike" dirty="0">
                         <a:solidFill>
-                          <a:schemeClr val="accent1"/>
+                          <a:schemeClr val="tx2">
+                            <a:lumMod val="75000"/>
+                          </a:schemeClr>
                         </a:solidFill>
                         <a:effectLst/>
                         <a:latin typeface="Calibri"/>
@@ -8293,6 +8335,11 @@
                     <a:noFill/>
                   </a:tcPr>
                 </a:tc>
+                <a:extLst>
+                  <a:ext uri="{0D108BD9-81ED-4DB2-BD59-A6C34878D82A}">
+                    <a16:rowId xmlns:a16="http://schemas.microsoft.com/office/drawing/2014/main" val="10002"/>
+                  </a:ext>
+                </a:extLst>
               </a:tr>
               <a:tr h="189431">
                 <a:tc>
@@ -8470,7 +8517,9 @@
                       <a:r>
                         <a:rPr lang="en-CA" sz="1200" b="1" u="none" strike="noStrike" dirty="0">
                           <a:solidFill>
-                            <a:schemeClr val="accent1"/>
+                            <a:schemeClr val="tx2">
+                              <a:lumMod val="75000"/>
+                            </a:schemeClr>
                           </a:solidFill>
                           <a:effectLst/>
                         </a:rPr>
@@ -8478,7 +8527,9 @@
                       </a:r>
                       <a:endParaRPr lang="en-CA" sz="1200" b="1" i="0" u="none" strike="noStrike" dirty="0">
                         <a:solidFill>
-                          <a:schemeClr val="accent1"/>
+                          <a:schemeClr val="tx2">
+                            <a:lumMod val="75000"/>
+                          </a:schemeClr>
                         </a:solidFill>
                         <a:effectLst/>
                         <a:latin typeface="Calibri"/>
@@ -8498,7 +8549,9 @@
                       <a:r>
                         <a:rPr lang="en-CA" sz="1200" b="1" u="none" strike="noStrike" dirty="0">
                           <a:solidFill>
-                            <a:schemeClr val="accent1"/>
+                            <a:schemeClr val="tx2">
+                              <a:lumMod val="75000"/>
+                            </a:schemeClr>
                           </a:solidFill>
                           <a:effectLst/>
                         </a:rPr>
@@ -8506,7 +8559,9 @@
                       </a:r>
                       <a:endParaRPr lang="en-CA" sz="1200" b="1" i="0" u="none" strike="noStrike" dirty="0">
                         <a:solidFill>
-                          <a:schemeClr val="accent1"/>
+                          <a:schemeClr val="tx2">
+                            <a:lumMod val="75000"/>
+                          </a:schemeClr>
                         </a:solidFill>
                         <a:effectLst/>
                         <a:latin typeface="Calibri"/>
@@ -8526,7 +8581,9 @@
                       <a:r>
                         <a:rPr lang="en-CA" sz="1200" b="1" u="none" strike="noStrike" dirty="0">
                           <a:solidFill>
-                            <a:schemeClr val="accent1"/>
+                            <a:schemeClr val="tx2">
+                              <a:lumMod val="75000"/>
+                            </a:schemeClr>
                           </a:solidFill>
                           <a:effectLst/>
                         </a:rPr>
@@ -8534,7 +8591,9 @@
                       </a:r>
                       <a:endParaRPr lang="en-CA" sz="1200" b="1" i="0" u="none" strike="noStrike" dirty="0">
                         <a:solidFill>
-                          <a:schemeClr val="accent1"/>
+                          <a:schemeClr val="tx2">
+                            <a:lumMod val="75000"/>
+                          </a:schemeClr>
                         </a:solidFill>
                         <a:effectLst/>
                         <a:latin typeface="Calibri"/>
@@ -8545,6 +8604,11 @@
                     <a:noFill/>
                   </a:tcPr>
                 </a:tc>
+                <a:extLst>
+                  <a:ext uri="{0D108BD9-81ED-4DB2-BD59-A6C34878D82A}">
+                    <a16:rowId xmlns:a16="http://schemas.microsoft.com/office/drawing/2014/main" val="10003"/>
+                  </a:ext>
+                </a:extLst>
               </a:tr>
               <a:tr h="189431">
                 <a:tc gridSpan="2">
@@ -8701,7 +8765,9 @@
                       <a:r>
                         <a:rPr lang="en-CA" sz="1200" b="1" u="none" strike="noStrike" dirty="0">
                           <a:solidFill>
-                            <a:schemeClr val="accent1"/>
+                            <a:schemeClr val="tx2">
+                              <a:lumMod val="75000"/>
+                            </a:schemeClr>
                           </a:solidFill>
                           <a:effectLst/>
                         </a:rPr>
@@ -8709,7 +8775,9 @@
                       </a:r>
                       <a:endParaRPr lang="en-CA" sz="1200" b="1" i="0" u="none" strike="noStrike" dirty="0">
                         <a:solidFill>
-                          <a:schemeClr val="accent1"/>
+                          <a:schemeClr val="tx2">
+                            <a:lumMod val="75000"/>
+                          </a:schemeClr>
                         </a:solidFill>
                         <a:effectLst/>
                         <a:latin typeface="Calibri"/>
@@ -8729,7 +8797,9 @@
                       <a:r>
                         <a:rPr lang="en-CA" sz="1200" b="1" u="none" strike="noStrike">
                           <a:solidFill>
-                            <a:schemeClr val="accent1"/>
+                            <a:schemeClr val="tx2">
+                              <a:lumMod val="75000"/>
+                            </a:schemeClr>
                           </a:solidFill>
                           <a:effectLst/>
                         </a:rPr>
@@ -8737,7 +8807,9 @@
                       </a:r>
                       <a:endParaRPr lang="en-CA" sz="1200" b="1" i="0" u="none" strike="noStrike">
                         <a:solidFill>
-                          <a:schemeClr val="accent1"/>
+                          <a:schemeClr val="tx2">
+                            <a:lumMod val="75000"/>
+                          </a:schemeClr>
                         </a:solidFill>
                         <a:effectLst/>
                         <a:latin typeface="Calibri"/>
@@ -8757,7 +8829,9 @@
                       <a:r>
                         <a:rPr lang="en-CA" sz="1200" b="1" u="none" strike="noStrike" dirty="0">
                           <a:solidFill>
-                            <a:schemeClr val="accent1"/>
+                            <a:schemeClr val="tx2">
+                              <a:lumMod val="75000"/>
+                            </a:schemeClr>
                           </a:solidFill>
                           <a:effectLst/>
                         </a:rPr>
@@ -8765,7 +8839,9 @@
                       </a:r>
                       <a:endParaRPr lang="en-CA" sz="1200" b="1" i="0" u="none" strike="noStrike" dirty="0">
                         <a:solidFill>
-                          <a:schemeClr val="accent1"/>
+                          <a:schemeClr val="tx2">
+                            <a:lumMod val="75000"/>
+                          </a:schemeClr>
                         </a:solidFill>
                         <a:effectLst/>
                         <a:latin typeface="Calibri"/>
@@ -8776,6 +8852,11 @@
                     <a:noFill/>
                   </a:tcPr>
                 </a:tc>
+                <a:extLst>
+                  <a:ext uri="{0D108BD9-81ED-4DB2-BD59-A6C34878D82A}">
+                    <a16:rowId xmlns:a16="http://schemas.microsoft.com/office/drawing/2014/main" val="10004"/>
+                  </a:ext>
+                </a:extLst>
               </a:tr>
               <a:tr h="189431">
                 <a:tc>
@@ -8927,7 +9008,9 @@
                       <a:r>
                         <a:rPr lang="en-CA" sz="1200" b="1" u="none" strike="noStrike" dirty="0">
                           <a:solidFill>
-                            <a:schemeClr val="accent1"/>
+                            <a:schemeClr val="tx2">
+                              <a:lumMod val="75000"/>
+                            </a:schemeClr>
                           </a:solidFill>
                           <a:effectLst/>
                         </a:rPr>
@@ -8935,7 +9018,9 @@
                       </a:r>
                       <a:endParaRPr lang="en-CA" sz="1200" b="1" i="0" u="none" strike="noStrike" dirty="0">
                         <a:solidFill>
-                          <a:schemeClr val="accent1"/>
+                          <a:schemeClr val="tx2">
+                            <a:lumMod val="75000"/>
+                          </a:schemeClr>
                         </a:solidFill>
                         <a:effectLst/>
                         <a:latin typeface="Calibri"/>
@@ -8962,7 +9047,9 @@
                       <a:r>
                         <a:rPr lang="en-CA" sz="1200" b="1" u="none" strike="noStrike">
                           <a:solidFill>
-                            <a:schemeClr val="accent1"/>
+                            <a:schemeClr val="tx2">
+                              <a:lumMod val="75000"/>
+                            </a:schemeClr>
                           </a:solidFill>
                           <a:effectLst/>
                         </a:rPr>
@@ -8970,7 +9057,9 @@
                       </a:r>
                       <a:endParaRPr lang="en-CA" sz="1200" b="1" i="0" u="none" strike="noStrike">
                         <a:solidFill>
-                          <a:schemeClr val="accent1"/>
+                          <a:schemeClr val="tx2">
+                            <a:lumMod val="75000"/>
+                          </a:schemeClr>
                         </a:solidFill>
                         <a:effectLst/>
                         <a:latin typeface="Calibri"/>
@@ -8991,17 +9080,21 @@
                     <a:p>
                       <a:pPr algn="l" fontAlgn="b"/>
                       <a:r>
-                        <a:rPr lang="en-CA" sz="1200" b="1" u="none" strike="noStrike">
+                        <a:rPr lang="en-CA" sz="1200" b="1" u="none" strike="noStrike" dirty="0">
                           <a:solidFill>
-                            <a:schemeClr val="accent1"/>
+                            <a:schemeClr val="tx2">
+                              <a:lumMod val="75000"/>
+                            </a:schemeClr>
                           </a:solidFill>
                           <a:effectLst/>
                         </a:rPr>
                         <a:t> </a:t>
                       </a:r>
-                      <a:endParaRPr lang="en-CA" sz="1200" b="1" i="0" u="none" strike="noStrike">
+                      <a:endParaRPr lang="en-CA" sz="1200" b="1" i="0" u="none" strike="noStrike" dirty="0">
                         <a:solidFill>
-                          <a:schemeClr val="accent1"/>
+                          <a:schemeClr val="tx2">
+                            <a:lumMod val="75000"/>
+                          </a:schemeClr>
                         </a:solidFill>
                         <a:effectLst/>
                         <a:latin typeface="Calibri"/>
@@ -9012,6 +9105,11 @@
                     <a:noFill/>
                   </a:tcPr>
                 </a:tc>
+                <a:extLst>
+                  <a:ext uri="{0D108BD9-81ED-4DB2-BD59-A6C34878D82A}">
+                    <a16:rowId xmlns:a16="http://schemas.microsoft.com/office/drawing/2014/main" val="10005"/>
+                  </a:ext>
+                </a:extLst>
               </a:tr>
               <a:tr h="189431">
                 <a:tc>
@@ -9163,7 +9261,9 @@
                       <a:r>
                         <a:rPr lang="en-CA" sz="1200" b="1" u="none" strike="noStrike">
                           <a:solidFill>
-                            <a:schemeClr val="accent1"/>
+                            <a:schemeClr val="tx2">
+                              <a:lumMod val="75000"/>
+                            </a:schemeClr>
                           </a:solidFill>
                           <a:effectLst/>
                         </a:rPr>
@@ -9171,7 +9271,9 @@
                       </a:r>
                       <a:endParaRPr lang="en-CA" sz="1200" b="1" i="0" u="none" strike="noStrike">
                         <a:solidFill>
-                          <a:schemeClr val="accent1"/>
+                          <a:schemeClr val="tx2">
+                            <a:lumMod val="75000"/>
+                          </a:schemeClr>
                         </a:solidFill>
                         <a:effectLst/>
                         <a:latin typeface="Calibri"/>
@@ -9198,7 +9300,9 @@
                       <a:r>
                         <a:rPr lang="en-CA" sz="1200" b="1" u="none" strike="noStrike">
                           <a:solidFill>
-                            <a:schemeClr val="accent1"/>
+                            <a:schemeClr val="tx2">
+                              <a:lumMod val="75000"/>
+                            </a:schemeClr>
                           </a:solidFill>
                           <a:effectLst/>
                         </a:rPr>
@@ -9206,7 +9310,9 @@
                       </a:r>
                       <a:endParaRPr lang="en-CA" sz="1200" b="1" i="0" u="none" strike="noStrike">
                         <a:solidFill>
-                          <a:schemeClr val="accent1"/>
+                          <a:schemeClr val="tx2">
+                            <a:lumMod val="75000"/>
+                          </a:schemeClr>
                         </a:solidFill>
                         <a:effectLst/>
                         <a:latin typeface="Calibri"/>
@@ -9227,17 +9333,21 @@
                     <a:p>
                       <a:pPr algn="l" fontAlgn="b"/>
                       <a:r>
-                        <a:rPr lang="en-CA" sz="1200" b="1" u="none" strike="noStrike">
+                        <a:rPr lang="en-CA" sz="1200" b="1" u="none" strike="noStrike" dirty="0">
                           <a:solidFill>
-                            <a:schemeClr val="accent1"/>
+                            <a:schemeClr val="tx2">
+                              <a:lumMod val="75000"/>
+                            </a:schemeClr>
                           </a:solidFill>
                           <a:effectLst/>
                         </a:rPr>
                         <a:t> </a:t>
                       </a:r>
-                      <a:endParaRPr lang="en-CA" sz="1200" b="1" i="0" u="none" strike="noStrike">
+                      <a:endParaRPr lang="en-CA" sz="1200" b="1" i="0" u="none" strike="noStrike" dirty="0">
                         <a:solidFill>
-                          <a:schemeClr val="accent1"/>
+                          <a:schemeClr val="tx2">
+                            <a:lumMod val="75000"/>
+                          </a:schemeClr>
                         </a:solidFill>
                         <a:effectLst/>
                         <a:latin typeface="Calibri"/>
@@ -9248,6 +9358,11 @@
                     <a:noFill/>
                   </a:tcPr>
                 </a:tc>
+                <a:extLst>
+                  <a:ext uri="{0D108BD9-81ED-4DB2-BD59-A6C34878D82A}">
+                    <a16:rowId xmlns:a16="http://schemas.microsoft.com/office/drawing/2014/main" val="10006"/>
+                  </a:ext>
+                </a:extLst>
               </a:tr>
               <a:tr h="189431">
                 <a:tc>
@@ -9399,7 +9514,9 @@
                       <a:r>
                         <a:rPr lang="en-CA" sz="1200" b="1" u="none" strike="noStrike">
                           <a:solidFill>
-                            <a:schemeClr val="accent1"/>
+                            <a:schemeClr val="tx2">
+                              <a:lumMod val="75000"/>
+                            </a:schemeClr>
                           </a:solidFill>
                           <a:effectLst/>
                         </a:rPr>
@@ -9407,7 +9524,9 @@
                       </a:r>
                       <a:endParaRPr lang="en-CA" sz="1200" b="1" i="0" u="none" strike="noStrike">
                         <a:solidFill>
-                          <a:schemeClr val="accent1"/>
+                          <a:schemeClr val="tx2">
+                            <a:lumMod val="75000"/>
+                          </a:schemeClr>
                         </a:solidFill>
                         <a:effectLst/>
                         <a:latin typeface="Calibri"/>
@@ -9427,7 +9546,9 @@
                       <a:r>
                         <a:rPr lang="en-CA" sz="1200" b="1" u="none" strike="noStrike" dirty="0">
                           <a:solidFill>
-                            <a:schemeClr val="accent1"/>
+                            <a:schemeClr val="tx2">
+                              <a:lumMod val="75000"/>
+                            </a:schemeClr>
                           </a:solidFill>
                           <a:effectLst/>
                         </a:rPr>
@@ -9435,7 +9556,9 @@
                       </a:r>
                       <a:endParaRPr lang="en-CA" sz="1200" b="1" i="0" u="none" strike="noStrike" dirty="0">
                         <a:solidFill>
-                          <a:schemeClr val="accent1"/>
+                          <a:schemeClr val="tx2">
+                            <a:lumMod val="75000"/>
+                          </a:schemeClr>
                         </a:solidFill>
                         <a:effectLst/>
                         <a:latin typeface="Calibri"/>
@@ -9453,17 +9576,21 @@
                     <a:p>
                       <a:pPr algn="l" fontAlgn="b"/>
                       <a:r>
-                        <a:rPr lang="en-CA" sz="1200" b="1" u="none" strike="noStrike">
+                        <a:rPr lang="en-CA" sz="1200" b="1" u="none" strike="noStrike" dirty="0">
                           <a:solidFill>
-                            <a:schemeClr val="accent1"/>
+                            <a:schemeClr val="tx2">
+                              <a:lumMod val="75000"/>
+                            </a:schemeClr>
                           </a:solidFill>
                           <a:effectLst/>
                         </a:rPr>
                         <a:t> </a:t>
                       </a:r>
-                      <a:endParaRPr lang="en-CA" sz="1200" b="1" i="0" u="none" strike="noStrike">
+                      <a:endParaRPr lang="en-CA" sz="1200" b="1" i="0" u="none" strike="noStrike" dirty="0">
                         <a:solidFill>
-                          <a:schemeClr val="accent1"/>
+                          <a:schemeClr val="tx2">
+                            <a:lumMod val="75000"/>
+                          </a:schemeClr>
                         </a:solidFill>
                         <a:effectLst/>
                         <a:latin typeface="Calibri"/>
@@ -9474,6 +9601,11 @@
                     <a:noFill/>
                   </a:tcPr>
                 </a:tc>
+                <a:extLst>
+                  <a:ext uri="{0D108BD9-81ED-4DB2-BD59-A6C34878D82A}">
+                    <a16:rowId xmlns:a16="http://schemas.microsoft.com/office/drawing/2014/main" val="10007"/>
+                  </a:ext>
+                </a:extLst>
               </a:tr>
               <a:tr h="252575">
                 <a:tc gridSpan="3">
@@ -9623,17 +9755,21 @@
                     <a:p>
                       <a:pPr algn="l" fontAlgn="b"/>
                       <a:r>
-                        <a:rPr lang="en-CA" sz="1200" b="1" u="none" strike="noStrike">
+                        <a:rPr lang="en-CA" sz="1200" b="1" u="none" strike="noStrike" dirty="0">
                           <a:solidFill>
-                            <a:schemeClr val="accent1"/>
+                            <a:schemeClr val="tx2">
+                              <a:lumMod val="75000"/>
+                            </a:schemeClr>
                           </a:solidFill>
                           <a:effectLst/>
                         </a:rPr>
                         <a:t>(Debt BV)</a:t>
                       </a:r>
-                      <a:endParaRPr lang="en-CA" sz="1200" b="1" i="0" u="none" strike="noStrike">
+                      <a:endParaRPr lang="en-CA" sz="1200" b="1" i="0" u="none" strike="noStrike" dirty="0">
                         <a:solidFill>
-                          <a:schemeClr val="accent1"/>
+                          <a:schemeClr val="tx2">
+                            <a:lumMod val="75000"/>
+                          </a:schemeClr>
                         </a:solidFill>
                         <a:effectLst/>
                         <a:latin typeface="Calibri"/>
@@ -9643,7 +9779,7 @@
                   <a:tcPr marL="9525" marR="9525" marT="9525" marB="0" anchor="b">
                     <a:lnB w="12700" cap="flat" cmpd="sng" algn="ctr">
                       <a:solidFill>
-                        <a:srgbClr val="2E6E9E"/>
+                        <a:schemeClr val="tx2"/>
                       </a:solidFill>
                       <a:prstDash val="solid"/>
                       <a:round/>
@@ -9662,7 +9798,9 @@
                       <a:r>
                         <a:rPr lang="en-CA" sz="1200" b="1" u="none" strike="noStrike" dirty="0">
                           <a:solidFill>
-                            <a:schemeClr val="accent1"/>
+                            <a:schemeClr val="tx2">
+                              <a:lumMod val="75000"/>
+                            </a:schemeClr>
                           </a:solidFill>
                           <a:effectLst/>
                         </a:rPr>
@@ -9670,7 +9808,9 @@
                       </a:r>
                       <a:endParaRPr lang="en-CA" sz="1200" b="1" i="0" u="none" strike="noStrike" dirty="0">
                         <a:solidFill>
-                          <a:schemeClr val="accent1"/>
+                          <a:schemeClr val="tx2">
+                            <a:lumMod val="75000"/>
+                          </a:schemeClr>
                         </a:solidFill>
                         <a:effectLst/>
                         <a:latin typeface="Calibri"/>
@@ -9680,7 +9820,7 @@
                   <a:tcPr marL="9525" marR="9525" marT="9525" marB="0" anchor="b">
                     <a:lnB w="12700" cap="flat" cmpd="sng" algn="ctr">
                       <a:solidFill>
-                        <a:srgbClr val="2E6E9E"/>
+                        <a:schemeClr val="tx2"/>
                       </a:solidFill>
                       <a:prstDash val="solid"/>
                       <a:round/>
@@ -9699,7 +9839,9 @@
                       <a:r>
                         <a:rPr lang="en-CA" sz="1200" b="1" u="none" strike="noStrike" dirty="0">
                           <a:solidFill>
-                            <a:schemeClr val="accent1"/>
+                            <a:schemeClr val="tx2">
+                              <a:lumMod val="75000"/>
+                            </a:schemeClr>
                           </a:solidFill>
                           <a:effectLst/>
                         </a:rPr>
@@ -9707,7 +9849,9 @@
                       </a:r>
                       <a:endParaRPr lang="en-CA" sz="1200" b="1" i="0" u="none" strike="noStrike" dirty="0">
                         <a:solidFill>
-                          <a:schemeClr val="accent1"/>
+                          <a:schemeClr val="tx2">
+                            <a:lumMod val="75000"/>
+                          </a:schemeClr>
                         </a:solidFill>
                         <a:effectLst/>
                         <a:latin typeface="Calibri"/>
@@ -9717,7 +9861,7 @@
                   <a:tcPr marL="9525" marR="9525" marT="9525" marB="0" anchor="b">
                     <a:lnB w="12700" cap="flat" cmpd="sng" algn="ctr">
                       <a:solidFill>
-                        <a:srgbClr val="2E6E9E"/>
+                        <a:schemeClr val="tx2"/>
                       </a:solidFill>
                       <a:prstDash val="solid"/>
                       <a:round/>
@@ -9727,6 +9871,11 @@
                     <a:noFill/>
                   </a:tcPr>
                 </a:tc>
+                <a:extLst>
+                  <a:ext uri="{0D108BD9-81ED-4DB2-BD59-A6C34878D82A}">
+                    <a16:rowId xmlns:a16="http://schemas.microsoft.com/office/drawing/2014/main" val="10008"/>
+                  </a:ext>
+                </a:extLst>
               </a:tr>
               <a:tr h="252575">
                 <a:tc>
@@ -9921,17 +10070,21 @@
                     <a:p>
                       <a:pPr algn="l" fontAlgn="b"/>
                       <a:r>
-                        <a:rPr lang="en-CA" sz="1200" b="1" u="none" strike="noStrike">
+                        <a:rPr lang="en-CA" sz="1200" b="1" u="none" strike="noStrike" dirty="0">
                           <a:solidFill>
-                            <a:schemeClr val="accent1"/>
+                            <a:schemeClr val="tx2">
+                              <a:lumMod val="75000"/>
+                            </a:schemeClr>
                           </a:solidFill>
                           <a:effectLst/>
                         </a:rPr>
                         <a:t>           233,726,901 </a:t>
                       </a:r>
-                      <a:endParaRPr lang="en-CA" sz="1200" b="1" i="0" u="none" strike="noStrike">
+                      <a:endParaRPr lang="en-CA" sz="1200" b="1" i="0" u="none" strike="noStrike" dirty="0">
                         <a:solidFill>
-                          <a:schemeClr val="accent1"/>
+                          <a:schemeClr val="tx2">
+                            <a:lumMod val="75000"/>
+                          </a:schemeClr>
                         </a:solidFill>
                         <a:effectLst/>
                         <a:latin typeface="Calibri"/>
@@ -9941,7 +10094,7 @@
                   <a:tcPr marL="9525" marR="9525" marT="9525" marB="0" anchor="b">
                     <a:lnT w="12700" cap="flat" cmpd="sng" algn="ctr">
                       <a:solidFill>
-                        <a:srgbClr val="2E6E9E"/>
+                        <a:schemeClr val="tx2"/>
                       </a:solidFill>
                       <a:prstDash val="solid"/>
                       <a:round/>
@@ -9960,7 +10113,9 @@
                       <a:r>
                         <a:rPr lang="en-CA" sz="1200" b="1" u="none" strike="noStrike" dirty="0">
                           <a:solidFill>
-                            <a:schemeClr val="accent1"/>
+                            <a:schemeClr val="tx2">
+                              <a:lumMod val="75000"/>
+                            </a:schemeClr>
                           </a:solidFill>
                           <a:effectLst/>
                         </a:rPr>
@@ -9968,7 +10123,9 @@
                       </a:r>
                       <a:endParaRPr lang="en-CA" sz="1200" b="1" i="0" u="none" strike="noStrike" dirty="0">
                         <a:solidFill>
-                          <a:schemeClr val="accent1"/>
+                          <a:schemeClr val="tx2">
+                            <a:lumMod val="75000"/>
+                          </a:schemeClr>
                         </a:solidFill>
                         <a:effectLst/>
                         <a:latin typeface="Calibri"/>
@@ -9978,7 +10135,7 @@
                   <a:tcPr marL="9525" marR="9525" marT="9525" marB="0" anchor="b">
                     <a:lnT w="12700" cap="flat" cmpd="sng" algn="ctr">
                       <a:solidFill>
-                        <a:srgbClr val="2E6E9E"/>
+                        <a:schemeClr val="tx2"/>
                       </a:solidFill>
                       <a:prstDash val="solid"/>
                       <a:round/>
@@ -9995,17 +10152,21 @@
                     <a:p>
                       <a:pPr algn="l" fontAlgn="b"/>
                       <a:r>
-                        <a:rPr lang="en-CA" sz="1200" b="1" u="none" strike="noStrike">
+                        <a:rPr lang="en-CA" sz="1200" b="1" u="none" strike="noStrike" dirty="0">
                           <a:solidFill>
-                            <a:schemeClr val="accent1"/>
+                            <a:schemeClr val="tx2">
+                              <a:lumMod val="75000"/>
+                            </a:schemeClr>
                           </a:solidFill>
                           <a:effectLst/>
                         </a:rPr>
                         <a:t>          4,996,755,200 </a:t>
                       </a:r>
-                      <a:endParaRPr lang="en-CA" sz="1200" b="1" i="0" u="none" strike="noStrike">
+                      <a:endParaRPr lang="en-CA" sz="1200" b="1" i="0" u="none" strike="noStrike" dirty="0">
                         <a:solidFill>
-                          <a:schemeClr val="accent1"/>
+                          <a:schemeClr val="tx2">
+                            <a:lumMod val="75000"/>
+                          </a:schemeClr>
                         </a:solidFill>
                         <a:effectLst/>
                         <a:latin typeface="Calibri"/>
@@ -10015,7 +10176,7 @@
                   <a:tcPr marL="9525" marR="9525" marT="9525" marB="0" anchor="b">
                     <a:lnT w="12700" cap="flat" cmpd="sng" algn="ctr">
                       <a:solidFill>
-                        <a:srgbClr val="2E6E9E"/>
+                        <a:schemeClr val="tx2"/>
                       </a:solidFill>
                       <a:prstDash val="solid"/>
                       <a:round/>
@@ -10025,6 +10186,11 @@
                     <a:noFill/>
                   </a:tcPr>
                 </a:tc>
+                <a:extLst>
+                  <a:ext uri="{0D108BD9-81ED-4DB2-BD59-A6C34878D82A}">
+                    <a16:rowId xmlns:a16="http://schemas.microsoft.com/office/drawing/2014/main" val="10009"/>
+                  </a:ext>
+                </a:extLst>
               </a:tr>
               <a:tr h="189431">
                 <a:tc>
@@ -10176,7 +10342,9 @@
                       <a:r>
                         <a:rPr lang="en-CA" sz="1200" b="1" u="none" strike="noStrike" dirty="0">
                           <a:solidFill>
-                            <a:schemeClr val="accent1"/>
+                            <a:schemeClr val="tx2">
+                              <a:lumMod val="75000"/>
+                            </a:schemeClr>
                           </a:solidFill>
                           <a:effectLst/>
                         </a:rPr>
@@ -10184,7 +10352,9 @@
                       </a:r>
                       <a:endParaRPr lang="en-CA" sz="1200" b="1" i="0" u="none" strike="noStrike" dirty="0">
                         <a:solidFill>
-                          <a:schemeClr val="accent1"/>
+                          <a:schemeClr val="tx2">
+                            <a:lumMod val="75000"/>
+                          </a:schemeClr>
                         </a:solidFill>
                         <a:effectLst/>
                         <a:latin typeface="Calibri"/>
@@ -10204,7 +10374,9 @@
                       <a:r>
                         <a:rPr lang="en-CA" sz="1200" b="1" u="none" strike="noStrike" dirty="0">
                           <a:solidFill>
-                            <a:schemeClr val="accent1"/>
+                            <a:schemeClr val="tx2">
+                              <a:lumMod val="75000"/>
+                            </a:schemeClr>
                           </a:solidFill>
                           <a:effectLst/>
                         </a:rPr>
@@ -10212,7 +10384,9 @@
                       </a:r>
                       <a:endParaRPr lang="en-CA" sz="1200" b="1" i="0" u="none" strike="noStrike" dirty="0">
                         <a:solidFill>
-                          <a:schemeClr val="accent1"/>
+                          <a:schemeClr val="tx2">
+                            <a:lumMod val="75000"/>
+                          </a:schemeClr>
                         </a:solidFill>
                         <a:effectLst/>
                         <a:latin typeface="Calibri"/>
@@ -10232,7 +10406,9 @@
                       <a:r>
                         <a:rPr lang="en-CA" sz="1200" b="1" u="none" strike="noStrike" dirty="0">
                           <a:solidFill>
-                            <a:schemeClr val="accent1"/>
+                            <a:schemeClr val="tx2">
+                              <a:lumMod val="75000"/>
+                            </a:schemeClr>
                           </a:solidFill>
                           <a:effectLst/>
                         </a:rPr>
@@ -10240,7 +10416,9 @@
                       </a:r>
                       <a:endParaRPr lang="en-CA" sz="1200" b="1" i="0" u="none" strike="noStrike" dirty="0">
                         <a:solidFill>
-                          <a:schemeClr val="accent1"/>
+                          <a:schemeClr val="tx2">
+                            <a:lumMod val="75000"/>
+                          </a:schemeClr>
                         </a:solidFill>
                         <a:effectLst/>
                         <a:latin typeface="Calibri"/>
@@ -10251,6 +10429,11 @@
                     <a:noFill/>
                   </a:tcPr>
                 </a:tc>
+                <a:extLst>
+                  <a:ext uri="{0D108BD9-81ED-4DB2-BD59-A6C34878D82A}">
+                    <a16:rowId xmlns:a16="http://schemas.microsoft.com/office/drawing/2014/main" val="10010"/>
+                  </a:ext>
+                </a:extLst>
               </a:tr>
               <a:tr h="189431">
                 <a:tc>
@@ -10402,7 +10585,9 @@
                       <a:r>
                         <a:rPr lang="en-CA" sz="1200" b="1" u="none" strike="noStrike">
                           <a:solidFill>
-                            <a:schemeClr val="accent1"/>
+                            <a:schemeClr val="tx2">
+                              <a:lumMod val="75000"/>
+                            </a:schemeClr>
                           </a:solidFill>
                           <a:effectLst/>
                         </a:rPr>
@@ -10410,7 +10595,9 @@
                       </a:r>
                       <a:endParaRPr lang="en-CA" sz="1200" b="1" i="0" u="none" strike="noStrike">
                         <a:solidFill>
-                          <a:schemeClr val="accent1"/>
+                          <a:schemeClr val="tx2">
+                            <a:lumMod val="75000"/>
+                          </a:schemeClr>
                         </a:solidFill>
                         <a:effectLst/>
                         <a:latin typeface="Calibri"/>
@@ -10430,7 +10617,9 @@
                       <a:r>
                         <a:rPr lang="en-CA" sz="1200" b="1" u="none" strike="noStrike">
                           <a:solidFill>
-                            <a:schemeClr val="accent1"/>
+                            <a:schemeClr val="tx2">
+                              <a:lumMod val="75000"/>
+                            </a:schemeClr>
                           </a:solidFill>
                           <a:effectLst/>
                         </a:rPr>
@@ -10438,7 +10627,9 @@
                       </a:r>
                       <a:endParaRPr lang="en-CA" sz="1200" b="1" i="0" u="none" strike="noStrike">
                         <a:solidFill>
-                          <a:schemeClr val="accent1"/>
+                          <a:schemeClr val="tx2">
+                            <a:lumMod val="75000"/>
+                          </a:schemeClr>
                         </a:solidFill>
                         <a:effectLst/>
                         <a:latin typeface="Calibri"/>
@@ -10458,7 +10649,9 @@
                       <a:r>
                         <a:rPr lang="en-CA" sz="1200" b="1" u="none" strike="noStrike" dirty="0">
                           <a:solidFill>
-                            <a:schemeClr val="accent1"/>
+                            <a:schemeClr val="tx2">
+                              <a:lumMod val="75000"/>
+                            </a:schemeClr>
                           </a:solidFill>
                           <a:effectLst/>
                         </a:rPr>
@@ -10466,7 +10659,9 @@
                       </a:r>
                       <a:endParaRPr lang="en-CA" sz="1200" b="1" i="0" u="none" strike="noStrike" dirty="0">
                         <a:solidFill>
-                          <a:schemeClr val="accent1"/>
+                          <a:schemeClr val="tx2">
+                            <a:lumMod val="75000"/>
+                          </a:schemeClr>
                         </a:solidFill>
                         <a:effectLst/>
                         <a:latin typeface="Calibri"/>
@@ -10477,6 +10672,11 @@
                     <a:noFill/>
                   </a:tcPr>
                 </a:tc>
+                <a:extLst>
+                  <a:ext uri="{0D108BD9-81ED-4DB2-BD59-A6C34878D82A}">
+                    <a16:rowId xmlns:a16="http://schemas.microsoft.com/office/drawing/2014/main" val="10011"/>
+                  </a:ext>
+                </a:extLst>
               </a:tr>
               <a:tr h="189431">
                 <a:tc>
@@ -10628,7 +10828,9 @@
                       <a:r>
                         <a:rPr lang="en-CA" sz="1200" b="1" u="none" strike="noStrike" dirty="0">
                           <a:solidFill>
-                            <a:schemeClr val="accent1"/>
+                            <a:schemeClr val="tx2">
+                              <a:lumMod val="75000"/>
+                            </a:schemeClr>
                           </a:solidFill>
                           <a:effectLst/>
                         </a:rPr>
@@ -10636,7 +10838,9 @@
                       </a:r>
                       <a:endParaRPr lang="en-CA" sz="1200" b="1" i="0" u="none" strike="noStrike" dirty="0">
                         <a:solidFill>
-                          <a:schemeClr val="accent1"/>
+                          <a:schemeClr val="tx2">
+                            <a:lumMod val="75000"/>
+                          </a:schemeClr>
                         </a:solidFill>
                         <a:effectLst/>
                         <a:latin typeface="Calibri"/>
@@ -10656,7 +10860,9 @@
                       <a:r>
                         <a:rPr lang="en-CA" sz="1200" b="1" u="none" strike="noStrike">
                           <a:solidFill>
-                            <a:schemeClr val="accent1"/>
+                            <a:schemeClr val="tx2">
+                              <a:lumMod val="75000"/>
+                            </a:schemeClr>
                           </a:solidFill>
                           <a:effectLst/>
                         </a:rPr>
@@ -10664,7 +10870,9 @@
                       </a:r>
                       <a:endParaRPr lang="en-CA" sz="1200" b="1" i="0" u="none" strike="noStrike">
                         <a:solidFill>
-                          <a:schemeClr val="accent1"/>
+                          <a:schemeClr val="tx2">
+                            <a:lumMod val="75000"/>
+                          </a:schemeClr>
                         </a:solidFill>
                         <a:effectLst/>
                         <a:latin typeface="Calibri"/>
@@ -10684,7 +10892,9 @@
                       <a:r>
                         <a:rPr lang="en-CA" sz="1200" b="1" u="none" strike="noStrike" dirty="0">
                           <a:solidFill>
-                            <a:schemeClr val="accent1"/>
+                            <a:schemeClr val="tx2">
+                              <a:lumMod val="75000"/>
+                            </a:schemeClr>
                           </a:solidFill>
                           <a:effectLst/>
                         </a:rPr>
@@ -10692,7 +10902,9 @@
                       </a:r>
                       <a:endParaRPr lang="en-CA" sz="1200" b="1" i="0" u="none" strike="noStrike" dirty="0">
                         <a:solidFill>
-                          <a:schemeClr val="accent1"/>
+                          <a:schemeClr val="tx2">
+                            <a:lumMod val="75000"/>
+                          </a:schemeClr>
                         </a:solidFill>
                         <a:effectLst/>
                         <a:latin typeface="Calibri"/>
@@ -10703,6 +10915,11 @@
                     <a:noFill/>
                   </a:tcPr>
                 </a:tc>
+                <a:extLst>
+                  <a:ext uri="{0D108BD9-81ED-4DB2-BD59-A6C34878D82A}">
+                    <a16:rowId xmlns:a16="http://schemas.microsoft.com/office/drawing/2014/main" val="10012"/>
+                  </a:ext>
+                </a:extLst>
               </a:tr>
               <a:tr h="189431">
                 <a:tc>
@@ -10854,7 +11071,9 @@
                       <a:r>
                         <a:rPr lang="en-CA" sz="1200" b="1" u="none" strike="noStrike">
                           <a:solidFill>
-                            <a:schemeClr val="accent1"/>
+                            <a:schemeClr val="tx2">
+                              <a:lumMod val="75000"/>
+                            </a:schemeClr>
                           </a:solidFill>
                           <a:effectLst/>
                         </a:rPr>
@@ -10862,7 +11081,9 @@
                       </a:r>
                       <a:endParaRPr lang="en-CA" sz="1200" b="1" i="0" u="none" strike="noStrike">
                         <a:solidFill>
-                          <a:schemeClr val="accent1"/>
+                          <a:schemeClr val="tx2">
+                            <a:lumMod val="75000"/>
+                          </a:schemeClr>
                         </a:solidFill>
                         <a:effectLst/>
                         <a:latin typeface="Calibri"/>
@@ -10882,7 +11103,9 @@
                       <a:r>
                         <a:rPr lang="en-CA" sz="1200" b="1" u="none" strike="noStrike">
                           <a:solidFill>
-                            <a:schemeClr val="accent1"/>
+                            <a:schemeClr val="tx2">
+                              <a:lumMod val="75000"/>
+                            </a:schemeClr>
                           </a:solidFill>
                           <a:effectLst/>
                         </a:rPr>
@@ -10890,7 +11113,9 @@
                       </a:r>
                       <a:endParaRPr lang="en-CA" sz="1200" b="1" i="0" u="none" strike="noStrike">
                         <a:solidFill>
-                          <a:schemeClr val="accent1"/>
+                          <a:schemeClr val="tx2">
+                            <a:lumMod val="75000"/>
+                          </a:schemeClr>
                         </a:solidFill>
                         <a:effectLst/>
                         <a:latin typeface="Calibri"/>
@@ -10910,7 +11135,9 @@
                       <a:r>
                         <a:rPr lang="en-CA" sz="1200" b="1" u="none" strike="noStrike" dirty="0">
                           <a:solidFill>
-                            <a:schemeClr val="accent1"/>
+                            <a:schemeClr val="tx2">
+                              <a:lumMod val="75000"/>
+                            </a:schemeClr>
                           </a:solidFill>
                           <a:effectLst/>
                         </a:rPr>
@@ -10918,7 +11145,9 @@
                       </a:r>
                       <a:endParaRPr lang="en-CA" sz="1200" b="1" i="0" u="none" strike="noStrike" dirty="0">
                         <a:solidFill>
-                          <a:schemeClr val="accent1"/>
+                          <a:schemeClr val="tx2">
+                            <a:lumMod val="75000"/>
+                          </a:schemeClr>
                         </a:solidFill>
                         <a:effectLst/>
                         <a:latin typeface="Calibri"/>
@@ -10929,6 +11158,11 @@
                     <a:noFill/>
                   </a:tcPr>
                 </a:tc>
+                <a:extLst>
+                  <a:ext uri="{0D108BD9-81ED-4DB2-BD59-A6C34878D82A}">
+                    <a16:rowId xmlns:a16="http://schemas.microsoft.com/office/drawing/2014/main" val="10013"/>
+                  </a:ext>
+                </a:extLst>
               </a:tr>
               <a:tr h="189431">
                 <a:tc>
@@ -11080,7 +11314,9 @@
                       <a:r>
                         <a:rPr lang="en-CA" sz="1200" b="1" u="none" strike="noStrike" dirty="0">
                           <a:solidFill>
-                            <a:schemeClr val="accent5"/>
+                            <a:schemeClr val="tx2">
+                              <a:lumMod val="75000"/>
+                            </a:schemeClr>
                           </a:solidFill>
                           <a:effectLst/>
                         </a:rPr>
@@ -11088,7 +11324,9 @@
                       </a:r>
                       <a:endParaRPr lang="en-CA" sz="1200" b="1" i="0" u="none" strike="noStrike" dirty="0">
                         <a:solidFill>
-                          <a:schemeClr val="accent5"/>
+                          <a:schemeClr val="tx2">
+                            <a:lumMod val="75000"/>
+                          </a:schemeClr>
                         </a:solidFill>
                         <a:effectLst/>
                         <a:latin typeface="Calibri"/>
@@ -11108,7 +11346,9 @@
                       <a:r>
                         <a:rPr lang="en-CA" sz="1200" b="1" u="none" strike="noStrike" dirty="0">
                           <a:solidFill>
-                            <a:schemeClr val="accent5"/>
+                            <a:schemeClr val="tx2">
+                              <a:lumMod val="75000"/>
+                            </a:schemeClr>
                           </a:solidFill>
                           <a:effectLst/>
                         </a:rPr>
@@ -11116,7 +11356,9 @@
                       </a:r>
                       <a:endParaRPr lang="en-CA" sz="1200" b="1" i="0" u="none" strike="noStrike" dirty="0">
                         <a:solidFill>
-                          <a:schemeClr val="accent5"/>
+                          <a:schemeClr val="tx2">
+                            <a:lumMod val="75000"/>
+                          </a:schemeClr>
                         </a:solidFill>
                         <a:effectLst/>
                         <a:latin typeface="Calibri"/>
@@ -11136,7 +11378,9 @@
                       <a:r>
                         <a:rPr lang="en-CA" sz="1200" b="1" u="none" strike="noStrike" dirty="0">
                           <a:solidFill>
-                            <a:schemeClr val="accent5"/>
+                            <a:schemeClr val="tx2">
+                              <a:lumMod val="75000"/>
+                            </a:schemeClr>
                           </a:solidFill>
                           <a:effectLst/>
                         </a:rPr>
@@ -11144,7 +11388,9 @@
                       </a:r>
                       <a:endParaRPr lang="en-CA" sz="1200" b="1" i="0" u="none" strike="noStrike" dirty="0">
                         <a:solidFill>
-                          <a:schemeClr val="accent5"/>
+                          <a:schemeClr val="tx2">
+                            <a:lumMod val="75000"/>
+                          </a:schemeClr>
                         </a:solidFill>
                         <a:effectLst/>
                         <a:latin typeface="Calibri"/>
@@ -11155,6 +11401,11 @@
                     <a:noFill/>
                   </a:tcPr>
                 </a:tc>
+                <a:extLst>
+                  <a:ext uri="{0D108BD9-81ED-4DB2-BD59-A6C34878D82A}">
+                    <a16:rowId xmlns:a16="http://schemas.microsoft.com/office/drawing/2014/main" val="10014"/>
+                  </a:ext>
+                </a:extLst>
               </a:tr>
               <a:tr h="189431">
                 <a:tc>
@@ -11306,7 +11557,9 @@
                       <a:r>
                         <a:rPr lang="en-CA" sz="1200" b="1" u="none" strike="noStrike">
                           <a:solidFill>
-                            <a:schemeClr val="accent1"/>
+                            <a:schemeClr val="tx2">
+                              <a:lumMod val="75000"/>
+                            </a:schemeClr>
                           </a:solidFill>
                           <a:effectLst/>
                         </a:rPr>
@@ -11314,7 +11567,9 @@
                       </a:r>
                       <a:endParaRPr lang="en-CA" sz="1200" b="1" i="0" u="none" strike="noStrike">
                         <a:solidFill>
-                          <a:schemeClr val="accent1"/>
+                          <a:schemeClr val="tx2">
+                            <a:lumMod val="75000"/>
+                          </a:schemeClr>
                         </a:solidFill>
                         <a:effectLst/>
                         <a:latin typeface="Calibri"/>
@@ -11334,7 +11589,9 @@
                       <a:r>
                         <a:rPr lang="en-CA" sz="1200" b="1" u="none" strike="noStrike">
                           <a:solidFill>
-                            <a:schemeClr val="accent1"/>
+                            <a:schemeClr val="tx2">
+                              <a:lumMod val="75000"/>
+                            </a:schemeClr>
                           </a:solidFill>
                           <a:effectLst/>
                         </a:rPr>
@@ -11342,7 +11599,9 @@
                       </a:r>
                       <a:endParaRPr lang="en-CA" sz="1200" b="1" i="0" u="none" strike="noStrike">
                         <a:solidFill>
-                          <a:schemeClr val="accent1"/>
+                          <a:schemeClr val="tx2">
+                            <a:lumMod val="75000"/>
+                          </a:schemeClr>
                         </a:solidFill>
                         <a:effectLst/>
                         <a:latin typeface="Calibri"/>
@@ -11362,7 +11621,9 @@
                       <a:r>
                         <a:rPr lang="en-CA" sz="1200" b="1" u="none" strike="noStrike" dirty="0">
                           <a:solidFill>
-                            <a:schemeClr val="accent1"/>
+                            <a:schemeClr val="tx2">
+                              <a:lumMod val="75000"/>
+                            </a:schemeClr>
                           </a:solidFill>
                           <a:effectLst/>
                         </a:rPr>
@@ -11370,7 +11631,9 @@
                       </a:r>
                       <a:endParaRPr lang="en-CA" sz="1200" b="1" i="0" u="none" strike="noStrike" dirty="0">
                         <a:solidFill>
-                          <a:schemeClr val="accent1"/>
+                          <a:schemeClr val="tx2">
+                            <a:lumMod val="75000"/>
+                          </a:schemeClr>
                         </a:solidFill>
                         <a:effectLst/>
                         <a:latin typeface="Calibri"/>
@@ -11381,6 +11644,11 @@
                     <a:noFill/>
                   </a:tcPr>
                 </a:tc>
+                <a:extLst>
+                  <a:ext uri="{0D108BD9-81ED-4DB2-BD59-A6C34878D82A}">
+                    <a16:rowId xmlns:a16="http://schemas.microsoft.com/office/drawing/2014/main" val="10015"/>
+                  </a:ext>
+                </a:extLst>
               </a:tr>
               <a:tr h="189431">
                 <a:tc>
@@ -11392,7 +11660,7 @@
                       <a:r>
                         <a:rPr lang="en-CA" sz="1200" b="1" u="none" strike="noStrike" dirty="0">
                           <a:solidFill>
-                            <a:schemeClr val="accent1"/>
+                            <a:schemeClr val="accent5"/>
                           </a:solidFill>
                           <a:effectLst/>
                         </a:rPr>
@@ -11400,35 +11668,7 @@
                       </a:r>
                       <a:endParaRPr lang="en-CA" sz="1200" b="1" i="0" u="none" strike="noStrike" dirty="0">
                         <a:solidFill>
-                          <a:schemeClr val="accent1"/>
-                        </a:solidFill>
-                        <a:effectLst/>
-                        <a:latin typeface="Calibri"/>
-                      </a:endParaRPr>
-                    </a:p>
-                  </a:txBody>
-                  <a:tcPr marL="9525" marR="9525" marT="9525" marB="0" anchor="b">
-                    <a:noFill/>
-                  </a:tcPr>
-                </a:tc>
-                <a:tc>
-                  <a:txBody>
-                    <a:bodyPr/>
-                    <a:lstStyle/>
-                    <a:p>
-                      <a:pPr algn="l" fontAlgn="b"/>
-                      <a:r>
-                        <a:rPr lang="en-CA" sz="1200" b="1" u="none" strike="noStrike">
-                          <a:solidFill>
-                            <a:schemeClr val="accent1"/>
-                          </a:solidFill>
-                          <a:effectLst/>
-                        </a:rPr>
-                        <a:t> </a:t>
-                      </a:r>
-                      <a:endParaRPr lang="en-CA" sz="1200" b="1" i="0" u="none" strike="noStrike">
-                        <a:solidFill>
-                          <a:schemeClr val="accent1"/>
+                          <a:schemeClr val="accent5"/>
                         </a:solidFill>
                         <a:effectLst/>
                         <a:latin typeface="Calibri"/>
@@ -11448,7 +11688,7 @@
                       <a:r>
                         <a:rPr lang="en-CA" sz="1200" b="1" u="none" strike="noStrike" dirty="0">
                           <a:solidFill>
-                            <a:schemeClr val="accent1"/>
+                            <a:schemeClr val="accent5"/>
                           </a:solidFill>
                           <a:effectLst/>
                         </a:rPr>
@@ -11456,7 +11696,7 @@
                       </a:r>
                       <a:endParaRPr lang="en-CA" sz="1200" b="1" i="0" u="none" strike="noStrike" dirty="0">
                         <a:solidFill>
-                          <a:schemeClr val="accent1"/>
+                          <a:schemeClr val="accent5"/>
                         </a:solidFill>
                         <a:effectLst/>
                         <a:latin typeface="Calibri"/>
@@ -11476,15 +11716,15 @@
                       <a:r>
                         <a:rPr lang="en-CA" sz="1200" b="1" u="none" strike="noStrike" dirty="0">
                           <a:solidFill>
-                            <a:schemeClr val="accent1"/>
+                            <a:schemeClr val="accent5"/>
                           </a:solidFill>
                           <a:effectLst/>
                         </a:rPr>
-                        <a:t>    16.82 </a:t>
+                        <a:t> </a:t>
                       </a:r>
                       <a:endParaRPr lang="en-CA" sz="1200" b="1" i="0" u="none" strike="noStrike" dirty="0">
                         <a:solidFill>
-                          <a:schemeClr val="accent1"/>
+                          <a:schemeClr val="accent5"/>
                         </a:solidFill>
                         <a:effectLst/>
                         <a:latin typeface="Calibri"/>
@@ -11504,15 +11744,15 @@
                       <a:r>
                         <a:rPr lang="en-CA" sz="1200" b="1" u="none" strike="noStrike" dirty="0">
                           <a:solidFill>
-                            <a:schemeClr val="accent1"/>
+                            <a:schemeClr val="accent5"/>
                           </a:solidFill>
                           <a:effectLst/>
                         </a:rPr>
-                        <a:t>    17.59 </a:t>
+                        <a:t>    16.82 </a:t>
                       </a:r>
                       <a:endParaRPr lang="en-CA" sz="1200" b="1" i="0" u="none" strike="noStrike" dirty="0">
                         <a:solidFill>
-                          <a:schemeClr val="accent1"/>
+                          <a:schemeClr val="accent5"/>
                         </a:solidFill>
                         <a:effectLst/>
                         <a:latin typeface="Calibri"/>
@@ -11532,15 +11772,15 @@
                       <a:r>
                         <a:rPr lang="en-CA" sz="1200" b="1" u="none" strike="noStrike" dirty="0">
                           <a:solidFill>
-                            <a:schemeClr val="accent1"/>
+                            <a:schemeClr val="accent5"/>
                           </a:solidFill>
                           <a:effectLst/>
                         </a:rPr>
-                        <a:t>           197,768,917 </a:t>
+                        <a:t>    17.59 </a:t>
                       </a:r>
                       <a:endParaRPr lang="en-CA" sz="1200" b="1" i="0" u="none" strike="noStrike" dirty="0">
                         <a:solidFill>
-                          <a:schemeClr val="accent1"/>
+                          <a:schemeClr val="accent5"/>
                         </a:solidFill>
                         <a:effectLst/>
                         <a:latin typeface="Calibri"/>
@@ -11560,15 +11800,19 @@
                       <a:r>
                         <a:rPr lang="en-CA" sz="1200" b="1" u="none" strike="noStrike" dirty="0">
                           <a:solidFill>
-                            <a:schemeClr val="accent1"/>
+                            <a:schemeClr val="tx2">
+                              <a:lumMod val="75000"/>
+                            </a:schemeClr>
                           </a:solidFill>
                           <a:effectLst/>
                         </a:rPr>
-                        <a:t>    2,151,567,600 </a:t>
+                        <a:t>           197,768,917 </a:t>
                       </a:r>
                       <a:endParaRPr lang="en-CA" sz="1200" b="1" i="0" u="none" strike="noStrike" dirty="0">
                         <a:solidFill>
-                          <a:schemeClr val="accent1"/>
+                          <a:schemeClr val="tx2">
+                            <a:lumMod val="75000"/>
+                          </a:schemeClr>
                         </a:solidFill>
                         <a:effectLst/>
                         <a:latin typeface="Calibri"/>
@@ -11588,15 +11832,19 @@
                       <a:r>
                         <a:rPr lang="en-CA" sz="1200" b="1" u="none" strike="noStrike" dirty="0">
                           <a:solidFill>
-                            <a:schemeClr val="accent1"/>
+                            <a:schemeClr val="tx2">
+                              <a:lumMod val="75000"/>
+                            </a:schemeClr>
                           </a:solidFill>
                           <a:effectLst/>
                         </a:rPr>
-                        <a:t>          4,819,983,200 </a:t>
+                        <a:t>    2,151,567,600 </a:t>
                       </a:r>
                       <a:endParaRPr lang="en-CA" sz="1200" b="1" i="0" u="none" strike="noStrike" dirty="0">
                         <a:solidFill>
-                          <a:schemeClr val="accent1"/>
+                          <a:schemeClr val="tx2">
+                            <a:lumMod val="75000"/>
+                          </a:schemeClr>
                         </a:solidFill>
                         <a:effectLst/>
                         <a:latin typeface="Calibri"/>
@@ -11607,6 +11855,43 @@
                     <a:noFill/>
                   </a:tcPr>
                 </a:tc>
+                <a:tc>
+                  <a:txBody>
+                    <a:bodyPr/>
+                    <a:lstStyle/>
+                    <a:p>
+                      <a:pPr algn="l" fontAlgn="b"/>
+                      <a:r>
+                        <a:rPr lang="en-CA" sz="1200" b="1" u="none" strike="noStrike" dirty="0">
+                          <a:solidFill>
+                            <a:schemeClr val="tx2">
+                              <a:lumMod val="75000"/>
+                            </a:schemeClr>
+                          </a:solidFill>
+                          <a:effectLst/>
+                        </a:rPr>
+                        <a:t>          4,819,983,200 </a:t>
+                      </a:r>
+                      <a:endParaRPr lang="en-CA" sz="1200" b="1" i="0" u="none" strike="noStrike" dirty="0">
+                        <a:solidFill>
+                          <a:schemeClr val="tx2">
+                            <a:lumMod val="75000"/>
+                          </a:schemeClr>
+                        </a:solidFill>
+                        <a:effectLst/>
+                        <a:latin typeface="Calibri"/>
+                      </a:endParaRPr>
+                    </a:p>
+                  </a:txBody>
+                  <a:tcPr marL="9525" marR="9525" marT="9525" marB="0" anchor="b">
+                    <a:noFill/>
+                  </a:tcPr>
+                </a:tc>
+                <a:extLst>
+                  <a:ext uri="{0D108BD9-81ED-4DB2-BD59-A6C34878D82A}">
+                    <a16:rowId xmlns:a16="http://schemas.microsoft.com/office/drawing/2014/main" val="10016"/>
+                  </a:ext>
+                </a:extLst>
               </a:tr>
             </a:tbl>
           </a:graphicData>
@@ -11634,13 +11919,6 @@
       </p:transition>
     </mc:Fallback>
   </mc:AlternateContent>
-  <p:timing>
-    <p:tnLst>
-      <p:par>
-        <p:cTn id="1" dur="indefinite" restart="never" nodeType="tmRoot"/>
-      </p:par>
-    </p:tnLst>
-  </p:timing>
 </p:sld>
 </file>
 
@@ -12216,13 +12494,6 @@
       </p:transition>
     </mc:Fallback>
   </mc:AlternateContent>
-  <p:timing>
-    <p:tnLst>
-      <p:par>
-        <p:cTn id="1" dur="indefinite" restart="never" nodeType="tmRoot"/>
-      </p:par>
-    </p:tnLst>
-  </p:timing>
 </p:sld>
 </file>
 
@@ -12360,8 +12631,8 @@
         </p:blipFill>
         <p:spPr>
           <a:xfrm>
-            <a:off x="8092965" y="3848493"/>
-            <a:ext cx="3942099" cy="2287036"/>
+            <a:off x="7891677" y="3848492"/>
+            <a:ext cx="4143388" cy="2403815"/>
           </a:xfrm>
           <a:prstGeom prst="rect">
             <a:avLst/>
@@ -12390,13 +12661,6 @@
       </p:transition>
     </mc:Fallback>
   </mc:AlternateContent>
-  <p:timing>
-    <p:tnLst>
-      <p:par>
-        <p:cTn id="1" dur="indefinite" restart="never" nodeType="tmRoot"/>
-      </p:par>
-    </p:tnLst>
-  </p:timing>
 </p:sld>
 </file>
 
@@ -12602,13 +12866,6 @@
       </p:transition>
     </mc:Fallback>
   </mc:AlternateContent>
-  <p:timing>
-    <p:tnLst>
-      <p:par>
-        <p:cTn id="1" dur="indefinite" restart="never" nodeType="tmRoot"/>
-      </p:par>
-    </p:tnLst>
-  </p:timing>
 </p:sld>
 </file>
 
@@ -12882,6 +13139,30 @@
           </a:p>
         </p:txBody>
       </p:sp>
+      <p:pic>
+        <p:nvPicPr>
+          <p:cNvPr id="10" name="Picture 9"/>
+          <p:cNvPicPr>
+            <a:picLocks noChangeAspect="1"/>
+          </p:cNvPicPr>
+          <p:nvPr/>
+        </p:nvPicPr>
+        <p:blipFill>
+          <a:blip r:embed="rId4"/>
+          <a:stretch>
+            <a:fillRect/>
+          </a:stretch>
+        </p:blipFill>
+        <p:spPr>
+          <a:xfrm>
+            <a:off x="4369205" y="4608755"/>
+            <a:ext cx="1838709" cy="535570"/>
+          </a:xfrm>
+          <a:prstGeom prst="rect">
+            <a:avLst/>
+          </a:prstGeom>
+        </p:spPr>
+      </p:pic>
     </p:spTree>
     <p:extLst>
       <p:ext uri="{BB962C8B-B14F-4D97-AF65-F5344CB8AC3E}">
@@ -12904,13 +13185,6 @@
       </p:transition>
     </mc:Fallback>
   </mc:AlternateContent>
-  <p:timing>
-    <p:tnLst>
-      <p:par>
-        <p:cTn id="1" dur="indefinite" restart="never" nodeType="tmRoot"/>
-      </p:par>
-    </p:tnLst>
-  </p:timing>
 </p:sld>
 </file>
 
@@ -12964,6 +13238,45 @@
           </a:p>
         </p:txBody>
       </p:sp>
+      <p:sp>
+        <p:nvSpPr>
+          <p:cNvPr id="3" name="TextBox 2"/>
+          <p:cNvSpPr txBox="1"/>
+          <p:nvPr/>
+        </p:nvSpPr>
+        <p:spPr>
+          <a:xfrm>
+            <a:off x="111210" y="6275529"/>
+            <a:ext cx="7158681" cy="369332"/>
+          </a:xfrm>
+          <a:prstGeom prst="rect">
+            <a:avLst/>
+          </a:prstGeom>
+          <a:noFill/>
+        </p:spPr>
+        <p:txBody>
+          <a:bodyPr wrap="square" rtlCol="0">
+            <a:spAutoFit/>
+          </a:bodyPr>
+          <a:lstStyle/>
+          <a:p>
+            <a:r>
+              <a:rPr lang="en-US" b="1" dirty="0">
+                <a:solidFill>
+                  <a:schemeClr val="accent1"/>
+                </a:solidFill>
+                <a:hlinkClick r:id="rId2" action="ppaction://hlinksldjump"/>
+              </a:rPr>
+              <a:t>QA</a:t>
+            </a:r>
+            <a:endParaRPr lang="en-US" b="1" dirty="0">
+              <a:solidFill>
+                <a:schemeClr val="accent1"/>
+              </a:solidFill>
+            </a:endParaRPr>
+          </a:p>
+        </p:txBody>
+      </p:sp>
     </p:spTree>
     <p:extLst>
       <p:ext uri="{BB962C8B-B14F-4D97-AF65-F5344CB8AC3E}">
@@ -12986,13 +13299,6 @@
       </p:transition>
     </mc:Fallback>
   </mc:AlternateContent>
-  <p:timing>
-    <p:tnLst>
-      <p:par>
-        <p:cTn id="1" dur="indefinite" restart="never" nodeType="tmRoot"/>
-      </p:par>
-    </p:tnLst>
-  </p:timing>
 </p:sld>
 </file>
 
@@ -13056,20 +13362,12 @@
           </a:p>
           <a:p>
             <a:r>
-              <a:rPr lang="en-US" sz="3200" b="1" dirty="0" err="1">
+              <a:rPr lang="en-US" sz="3200" b="1" dirty="0">
                 <a:solidFill>
                   <a:schemeClr val="tx2"/>
                 </a:solidFill>
               </a:rPr>
-              <a:t>Wascana</a:t>
-            </a:r>
-            <a:r>
-              <a:rPr lang="en-US" sz="3200" b="1" dirty="0">
-                <a:solidFill>
-                  <a:schemeClr val="tx2"/>
-                </a:solidFill>
-              </a:rPr>
-              <a:t> Risk Mitigation</a:t>
+              <a:t>Wascana Risk Mitigation</a:t>
             </a:r>
           </a:p>
           <a:p>
@@ -13232,13 +13530,6 @@
       </p:transition>
     </mc:Fallback>
   </mc:AlternateContent>
-  <p:timing>
-    <p:tnLst>
-      <p:par>
-        <p:cTn id="1" dur="indefinite" restart="never" nodeType="tmRoot"/>
-      </p:par>
-    </p:tnLst>
-  </p:timing>
 </p:sld>
 </file>
 
@@ -13282,20 +13573,12 @@
           <a:lstStyle/>
           <a:p>
             <a:r>
-              <a:rPr lang="en-US" sz="4400" b="1" dirty="0" err="1">
+              <a:rPr lang="en-US" sz="4400" b="1" dirty="0">
                 <a:solidFill>
                   <a:schemeClr val="accent1"/>
                 </a:solidFill>
               </a:rPr>
-              <a:t>Wascana</a:t>
-            </a:r>
-            <a:r>
-              <a:rPr lang="en-US" sz="4400" b="1" dirty="0">
-                <a:solidFill>
-                  <a:schemeClr val="accent1"/>
-                </a:solidFill>
-              </a:rPr>
-              <a:t> Risk Management </a:t>
+              <a:t>Wascana Risk Management </a:t>
             </a:r>
           </a:p>
           <a:p>
@@ -13435,18 +13718,13 @@
             <a:p>
               <a:pPr algn="ctr"/>
               <a:r>
-                <a:rPr lang="en-US" b="1" dirty="0" err="1">
+                <a:rPr lang="en-US" b="1" dirty="0">
                   <a:solidFill>
                     <a:srgbClr val="F5F4F1"/>
                   </a:solidFill>
                 </a:rPr>
                 <a:t>Wascana</a:t>
               </a:r>
-              <a:endParaRPr lang="en-US" b="1" dirty="0">
-                <a:solidFill>
-                  <a:srgbClr val="F5F4F1"/>
-                </a:solidFill>
-              </a:endParaRPr>
             </a:p>
             <a:p>
               <a:pPr algn="ctr"/>
@@ -13588,7 +13866,7 @@
           </p:blipFill>
           <p:spPr bwMode="auto">
             <a:xfrm>
-              <a:off x="8704781" y="2864023"/>
+              <a:off x="8704781" y="2728943"/>
               <a:ext cx="479106" cy="277637"/>
             </a:xfrm>
             <a:prstGeom prst="rect">
@@ -13750,20 +14028,12 @@
           </a:p>
           <a:p>
             <a:r>
-              <a:rPr lang="en-US" sz="3200" b="1" dirty="0" err="1">
+              <a:rPr lang="en-US" sz="3200" b="1" dirty="0">
                 <a:solidFill>
                   <a:schemeClr val="accent1"/>
                 </a:solidFill>
               </a:rPr>
-              <a:t>Wascana</a:t>
-            </a:r>
-            <a:r>
-              <a:rPr lang="en-US" sz="3200" b="1" dirty="0">
-                <a:solidFill>
-                  <a:schemeClr val="accent1"/>
-                </a:solidFill>
-              </a:rPr>
-              <a:t> Risk Mitigation</a:t>
+              <a:t>Wascana Risk Mitigation</a:t>
             </a:r>
           </a:p>
           <a:p>
@@ -13800,13 +14070,6 @@
       </p:transition>
     </mc:Fallback>
   </mc:AlternateContent>
-  <p:timing>
-    <p:tnLst>
-      <p:par>
-        <p:cTn id="1" dur="indefinite" restart="never" nodeType="tmRoot"/>
-      </p:par>
-    </p:tnLst>
-  </p:timing>
 </p:sld>
 </file>
 
@@ -13829,6 +14092,56 @@
       </p:grpSpPr>
       <p:sp>
         <p:nvSpPr>
+          <p:cNvPr id="5" name="TextBox 4"/>
+          <p:cNvSpPr txBox="1"/>
+          <p:nvPr/>
+        </p:nvSpPr>
+        <p:spPr>
+          <a:xfrm>
+            <a:off x="5097743" y="5346114"/>
+            <a:ext cx="11471169" cy="1169551"/>
+          </a:xfrm>
+          <a:prstGeom prst="rect">
+            <a:avLst/>
+          </a:prstGeom>
+          <a:noFill/>
+        </p:spPr>
+        <p:txBody>
+          <a:bodyPr wrap="square" rtlCol="0">
+            <a:spAutoFit/>
+          </a:bodyPr>
+          <a:lstStyle/>
+          <a:p>
+            <a:r>
+              <a:rPr lang="en-US" sz="3200" b="1" dirty="0">
+                <a:solidFill>
+                  <a:schemeClr val="accent1"/>
+                </a:solidFill>
+              </a:rPr>
+              <a:t>Risked Undeveloped Land</a:t>
+            </a:r>
+          </a:p>
+          <a:p>
+            <a:endParaRPr lang="en-US" sz="1000" b="1" dirty="0">
+              <a:solidFill>
+                <a:schemeClr val="accent1"/>
+              </a:solidFill>
+            </a:endParaRPr>
+          </a:p>
+          <a:p>
+            <a:r>
+              <a:rPr lang="en-US" sz="2800" b="1" dirty="0">
+                <a:solidFill>
+                  <a:schemeClr val="accent1"/>
+                </a:solidFill>
+              </a:rPr>
+              <a:t>Price per Acre: $50.00-$75.00</a:t>
+            </a:r>
+          </a:p>
+        </p:txBody>
+      </p:sp>
+      <p:sp>
+        <p:nvSpPr>
           <p:cNvPr id="4" name="TextBox 3"/>
           <p:cNvSpPr txBox="1"/>
           <p:nvPr/>
@@ -13894,234 +14207,99 @@
           </a:p>
         </p:txBody>
       </p:sp>
-      <p:sp>
-        <p:nvSpPr>
-          <p:cNvPr id="5" name="TextBox 4"/>
-          <p:cNvSpPr txBox="1"/>
+      <p:grpSp>
+        <p:nvGrpSpPr>
+          <p:cNvPr id="2" name="Group 1"/>
+          <p:cNvGrpSpPr/>
           <p:nvPr/>
-        </p:nvSpPr>
-        <p:spPr>
+        </p:nvGrpSpPr>
+        <p:grpSpPr>
           <a:xfrm>
-            <a:off x="345989" y="147129"/>
-            <a:ext cx="11471169" cy="5324535"/>
+            <a:off x="343876" y="157205"/>
+            <a:ext cx="7885724" cy="5082712"/>
+            <a:chOff x="6810248" y="385011"/>
+            <a:chExt cx="5309142" cy="3677379"/>
           </a:xfrm>
-          <a:prstGeom prst="rect">
-            <a:avLst/>
-          </a:prstGeom>
-          <a:noFill/>
-        </p:spPr>
-        <p:txBody>
-          <a:bodyPr wrap="square" rtlCol="0">
-            <a:spAutoFit/>
-          </a:bodyPr>
-          <a:lstStyle/>
-          <a:p>
-            <a:r>
-              <a:rPr lang="en-US" sz="4400" b="1" dirty="0">
-                <a:solidFill>
-                  <a:schemeClr val="accent1"/>
-                </a:solidFill>
-              </a:rPr>
-              <a:t>Risked Undeveloped Land</a:t>
-            </a:r>
-          </a:p>
-          <a:p>
-            <a:endParaRPr lang="en-US" sz="1200" b="1" dirty="0">
-              <a:solidFill>
-                <a:schemeClr val="accent1"/>
-              </a:solidFill>
-            </a:endParaRPr>
-          </a:p>
-          <a:p>
-            <a:r>
-              <a:rPr lang="en-US" sz="4000" b="1" dirty="0">
-                <a:solidFill>
-                  <a:schemeClr val="accent1"/>
-                </a:solidFill>
-              </a:rPr>
-              <a:t>Price per Acre: $50.00-$75.00</a:t>
-            </a:r>
-          </a:p>
-          <a:p>
-            <a:endParaRPr lang="en-US" sz="4000" b="1" dirty="0">
-              <a:solidFill>
-                <a:schemeClr val="accent1"/>
-              </a:solidFill>
-            </a:endParaRPr>
-          </a:p>
-          <a:p>
-            <a:endParaRPr lang="en-US" sz="4000" b="1" dirty="0">
-              <a:solidFill>
-                <a:schemeClr val="accent1"/>
-              </a:solidFill>
-            </a:endParaRPr>
-          </a:p>
-          <a:p>
-            <a:endParaRPr lang="en-US" sz="4000" b="1" dirty="0">
-              <a:solidFill>
-                <a:schemeClr val="accent1"/>
-              </a:solidFill>
-            </a:endParaRPr>
-          </a:p>
-          <a:p>
-            <a:endParaRPr lang="en-US" sz="4000" b="1" dirty="0">
-              <a:solidFill>
-                <a:schemeClr val="accent1"/>
-              </a:solidFill>
-            </a:endParaRPr>
-          </a:p>
-          <a:p>
-            <a:r>
-              <a:rPr lang="en-US" sz="2800" b="1" dirty="0">
-                <a:solidFill>
-                  <a:schemeClr val="accent1"/>
-                </a:solidFill>
-              </a:rPr>
-              <a:t>Conservative Approach:</a:t>
-            </a:r>
-          </a:p>
-          <a:p>
-            <a:r>
-              <a:rPr lang="en-US" sz="3200" b="1" dirty="0">
-                <a:solidFill>
-                  <a:schemeClr val="accent1"/>
-                </a:solidFill>
-              </a:rPr>
-              <a:t>Market Prices Are An Expectation of Gross Profit</a:t>
-            </a:r>
-            <a:endParaRPr lang="en-US" sz="2800" b="1" dirty="0">
-              <a:solidFill>
-                <a:schemeClr val="accent1"/>
-              </a:solidFill>
-            </a:endParaRPr>
-          </a:p>
-          <a:p>
-            <a:pPr algn="ctr"/>
-            <a:endParaRPr lang="en-US" sz="2400" b="1" dirty="0">
-              <a:solidFill>
-                <a:schemeClr val="accent1"/>
-              </a:solidFill>
-            </a:endParaRPr>
-          </a:p>
-        </p:txBody>
-      </p:sp>
-      <p:pic>
-        <p:nvPicPr>
-          <p:cNvPr id="6" name="Picture 5"/>
-          <p:cNvPicPr>
-            <a:picLocks noChangeAspect="1"/>
-          </p:cNvPicPr>
-          <p:nvPr/>
-        </p:nvPicPr>
-        <p:blipFill>
-          <a:blip r:embed="rId2">
-            <a:extLst>
-              <a:ext uri="{28A0092B-C50C-407E-A947-70E740481C1C}">
-                <a14:useLocalDpi xmlns:a14="http://schemas.microsoft.com/office/drawing/2010/main" val="0"/>
-              </a:ext>
-            </a:extLst>
-          </a:blip>
-          <a:stretch>
-            <a:fillRect/>
-          </a:stretch>
-        </p:blipFill>
-        <p:spPr>
-          <a:xfrm>
-            <a:off x="6810248" y="385011"/>
-            <a:ext cx="5309142" cy="3677379"/>
-          </a:xfrm>
-          <a:prstGeom prst="rect">
-            <a:avLst/>
-          </a:prstGeom>
-        </p:spPr>
-      </p:pic>
-      <p:cxnSp>
-        <p:nvCxnSpPr>
-          <p:cNvPr id="7" name="Straight Connector 6"/>
-          <p:cNvCxnSpPr/>
-          <p:nvPr/>
-        </p:nvCxnSpPr>
-        <p:spPr>
-          <a:xfrm>
-            <a:off x="8841369" y="610468"/>
-            <a:ext cx="6069" cy="3047132"/>
-          </a:xfrm>
-          <a:prstGeom prst="line">
-            <a:avLst/>
-          </a:prstGeom>
-          <a:ln w="9525" cap="flat" cmpd="sng" algn="ctr">
+        </p:grpSpPr>
+        <p:pic>
+          <p:nvPicPr>
+            <p:cNvPr id="6" name="Picture 5"/>
+            <p:cNvPicPr>
+              <a:picLocks noChangeAspect="1"/>
+            </p:cNvPicPr>
+            <p:nvPr/>
+          </p:nvPicPr>
+          <p:blipFill>
+            <a:blip r:embed="rId2">
+              <a:extLst>
+                <a:ext uri="{28A0092B-C50C-407E-A947-70E740481C1C}">
+                  <a14:useLocalDpi xmlns:a14="http://schemas.microsoft.com/office/drawing/2010/main" val="0"/>
+                </a:ext>
+              </a:extLst>
+            </a:blip>
+            <a:stretch>
+              <a:fillRect/>
+            </a:stretch>
+          </p:blipFill>
+          <p:spPr>
+            <a:xfrm>
+              <a:off x="6810248" y="385011"/>
+              <a:ext cx="5309142" cy="3677379"/>
+            </a:xfrm>
+            <a:prstGeom prst="rect">
+              <a:avLst/>
+            </a:prstGeom>
+          </p:spPr>
+        </p:pic>
+        <p:sp>
+          <p:nvSpPr>
+            <p:cNvPr id="9" name="Rectangle 8"/>
+            <p:cNvSpPr/>
+            <p:nvPr/>
+          </p:nvSpPr>
+          <p:spPr>
+            <a:xfrm>
+              <a:off x="7142205" y="610468"/>
+              <a:ext cx="1699164" cy="3047132"/>
+            </a:xfrm>
+            <a:prstGeom prst="rect">
+              <a:avLst/>
+            </a:prstGeom>
             <a:solidFill>
+              <a:srgbClr val="2E6E9E">
+                <a:alpha val="18824"/>
+              </a:srgbClr>
+            </a:solidFill>
+            <a:ln>
+              <a:prstDash val="sysDot"/>
+            </a:ln>
+          </p:spPr>
+          <p:style>
+            <a:lnRef idx="2">
+              <a:schemeClr val="accent1">
+                <a:shade val="50000"/>
+              </a:schemeClr>
+            </a:lnRef>
+            <a:fillRef idx="1">
               <a:schemeClr val="accent1"/>
-            </a:solidFill>
-            <a:prstDash val="dash"/>
-            <a:round/>
-            <a:headEnd type="none" w="med" len="med"/>
-            <a:tailEnd type="none" w="med" len="med"/>
-          </a:ln>
-        </p:spPr>
-        <p:style>
-          <a:lnRef idx="0">
-            <a:scrgbClr r="0" g="0" b="0"/>
-          </a:lnRef>
-          <a:fillRef idx="0">
-            <a:scrgbClr r="0" g="0" b="0"/>
-          </a:fillRef>
-          <a:effectRef idx="0">
-            <a:scrgbClr r="0" g="0" b="0"/>
-          </a:effectRef>
-          <a:fontRef idx="minor">
-            <a:schemeClr val="tx1"/>
-          </a:fontRef>
-        </p:style>
-      </p:cxnSp>
-      <p:sp>
-        <p:nvSpPr>
-          <p:cNvPr id="9" name="Rectangle 8"/>
-          <p:cNvSpPr/>
-          <p:nvPr/>
-        </p:nvSpPr>
-        <p:spPr>
-          <a:xfrm>
-            <a:off x="7142205" y="610468"/>
-            <a:ext cx="1699164" cy="3047132"/>
-          </a:xfrm>
-          <a:prstGeom prst="rect">
-            <a:avLst/>
-          </a:prstGeom>
-          <a:solidFill>
-            <a:srgbClr val="2E6E9E">
-              <a:alpha val="18824"/>
-            </a:srgbClr>
-          </a:solidFill>
-          <a:ln>
-            <a:prstDash val="sysDot"/>
-          </a:ln>
-        </p:spPr>
-        <p:style>
-          <a:lnRef idx="2">
-            <a:schemeClr val="accent1">
-              <a:shade val="50000"/>
-            </a:schemeClr>
-          </a:lnRef>
-          <a:fillRef idx="1">
-            <a:schemeClr val="accent1"/>
-          </a:fillRef>
-          <a:effectRef idx="0">
-            <a:schemeClr val="accent1"/>
-          </a:effectRef>
-          <a:fontRef idx="minor">
-            <a:schemeClr val="lt1"/>
-          </a:fontRef>
-        </p:style>
-        <p:txBody>
-          <a:bodyPr rtlCol="0" anchor="ctr"/>
-          <a:lstStyle/>
-          <a:p>
-            <a:pPr algn="ctr"/>
-            <a:endParaRPr lang="en-US"/>
-          </a:p>
-        </p:txBody>
-      </p:sp>
+            </a:fillRef>
+            <a:effectRef idx="0">
+              <a:schemeClr val="accent1"/>
+            </a:effectRef>
+            <a:fontRef idx="minor">
+              <a:schemeClr val="lt1"/>
+            </a:fontRef>
+          </p:style>
+          <p:txBody>
+            <a:bodyPr rtlCol="0" anchor="ctr"/>
+            <a:lstStyle/>
+            <a:p>
+              <a:pPr algn="ctr"/>
+              <a:endParaRPr lang="en-US"/>
+            </a:p>
+          </p:txBody>
+        </p:sp>
+      </p:grpSp>
     </p:spTree>
     <p:extLst>
       <p:ext uri="{BB962C8B-B14F-4D97-AF65-F5344CB8AC3E}">
@@ -14144,13 +14322,6 @@
       </p:transition>
     </mc:Fallback>
   </mc:AlternateContent>
-  <p:timing>
-    <p:tnLst>
-      <p:par>
-        <p:cTn id="1" dur="indefinite" restart="never" nodeType="tmRoot"/>
-      </p:par>
-    </p:tnLst>
-  </p:timing>
 </p:sld>
 </file>
 
@@ -14289,7 +14460,7 @@
         </p:nvSpPr>
         <p:spPr>
           <a:xfrm>
-            <a:off x="6096000" y="1026388"/>
+            <a:off x="6096000" y="1022478"/>
             <a:ext cx="5675870" cy="707886"/>
           </a:xfrm>
           <a:prstGeom prst="rect">
@@ -14371,13 +14542,6 @@
       </p:transition>
     </mc:Fallback>
   </mc:AlternateContent>
-  <p:timing>
-    <p:tnLst>
-      <p:par>
-        <p:cTn id="1" dur="indefinite" restart="never" nodeType="tmRoot"/>
-      </p:par>
-    </p:tnLst>
-  </p:timing>
 </p:sld>
 </file>
 
@@ -14532,7 +14696,7 @@
           <a:lstStyle/>
           <a:p>
             <a:r>
-              <a:rPr lang="en-US" sz="2800" b="1" dirty="0" err="1">
+              <a:rPr lang="en-US" sz="2800" b="1" dirty="0">
                 <a:solidFill>
                   <a:schemeClr val="tx1">
                     <a:lumMod val="50000"/>
@@ -14540,18 +14704,7 @@
                   </a:schemeClr>
                 </a:solidFill>
               </a:rPr>
-              <a:t>Wascana</a:t>
-            </a:r>
-            <a:r>
-              <a:rPr lang="en-US" sz="2800" b="1" dirty="0">
-                <a:solidFill>
-                  <a:schemeClr val="tx1">
-                    <a:lumMod val="50000"/>
-                    <a:lumOff val="50000"/>
-                  </a:schemeClr>
-                </a:solidFill>
-              </a:rPr>
-              <a:t> Energy Inc.</a:t>
+              <a:t>Wascana Energy Inc.</a:t>
             </a:r>
           </a:p>
           <a:p>
@@ -14672,13 +14825,6 @@
       </p:transition>
     </mc:Fallback>
   </mc:AlternateContent>
-  <p:timing>
-    <p:tnLst>
-      <p:par>
-        <p:cTn id="1" dur="indefinite" restart="never" nodeType="tmRoot"/>
-      </p:par>
-    </p:tnLst>
-  </p:timing>
 </p:sld>
 </file>
 
@@ -14754,13 +14900,6 @@
       </p:transition>
     </mc:Fallback>
   </mc:AlternateContent>
-  <p:timing>
-    <p:tnLst>
-      <p:par>
-        <p:cTn id="1" dur="indefinite" restart="never" nodeType="tmRoot"/>
-      </p:par>
-    </p:tnLst>
-  </p:timing>
 </p:sld>
 </file>
 
@@ -14789,7 +14928,7 @@
         </p:nvSpPr>
         <p:spPr>
           <a:xfrm>
-            <a:off x="3679126" y="3105834"/>
+            <a:off x="3572952" y="3089358"/>
             <a:ext cx="4677242" cy="646331"/>
           </a:xfrm>
           <a:prstGeom prst="rect">
@@ -14811,6 +14950,322 @@
               </a:rPr>
               <a:t>Questions and Answers</a:t>
             </a:r>
+          </a:p>
+        </p:txBody>
+      </p:sp>
+      <p:sp>
+        <p:nvSpPr>
+          <p:cNvPr id="3" name="TextBox 2"/>
+          <p:cNvSpPr txBox="1"/>
+          <p:nvPr/>
+        </p:nvSpPr>
+        <p:spPr>
+          <a:xfrm>
+            <a:off x="6153665" y="5672060"/>
+            <a:ext cx="5675870" cy="369332"/>
+          </a:xfrm>
+          <a:prstGeom prst="rect">
+            <a:avLst/>
+          </a:prstGeom>
+          <a:noFill/>
+        </p:spPr>
+        <p:txBody>
+          <a:bodyPr wrap="square" rtlCol="0">
+            <a:spAutoFit/>
+          </a:bodyPr>
+          <a:lstStyle/>
+          <a:p>
+            <a:pPr algn="r"/>
+            <a:r>
+              <a:rPr lang="en-US" b="1" dirty="0">
+                <a:solidFill>
+                  <a:schemeClr val="accent1"/>
+                </a:solidFill>
+                <a:hlinkClick r:id="rId2" action="ppaction://hlinksldjump"/>
+              </a:rPr>
+              <a:t>Quantitative Analysis</a:t>
+            </a:r>
+            <a:endParaRPr lang="en-US" b="1" dirty="0">
+              <a:solidFill>
+                <a:schemeClr val="accent1"/>
+              </a:solidFill>
+            </a:endParaRPr>
+          </a:p>
+        </p:txBody>
+      </p:sp>
+      <p:sp>
+        <p:nvSpPr>
+          <p:cNvPr id="4" name="TextBox 3"/>
+          <p:cNvSpPr txBox="1"/>
+          <p:nvPr/>
+        </p:nvSpPr>
+        <p:spPr>
+          <a:xfrm>
+            <a:off x="4959179" y="6097876"/>
+            <a:ext cx="6870356" cy="369332"/>
+          </a:xfrm>
+          <a:prstGeom prst="rect">
+            <a:avLst/>
+          </a:prstGeom>
+          <a:noFill/>
+        </p:spPr>
+        <p:txBody>
+          <a:bodyPr wrap="square" rtlCol="0">
+            <a:spAutoFit/>
+          </a:bodyPr>
+          <a:lstStyle/>
+          <a:p>
+            <a:pPr algn="r"/>
+            <a:r>
+              <a:rPr lang="en-US" b="1" dirty="0">
+                <a:solidFill>
+                  <a:schemeClr val="accent1"/>
+                </a:solidFill>
+                <a:hlinkClick r:id="rId3" action="ppaction://hlinksldjump"/>
+              </a:rPr>
+              <a:t>Qualitative Considerations</a:t>
+            </a:r>
+            <a:endParaRPr lang="en-US" b="1" dirty="0">
+              <a:solidFill>
+                <a:schemeClr val="accent1"/>
+              </a:solidFill>
+            </a:endParaRPr>
+          </a:p>
+        </p:txBody>
+      </p:sp>
+      <p:sp>
+        <p:nvSpPr>
+          <p:cNvPr id="5" name="TextBox 4"/>
+          <p:cNvSpPr txBox="1"/>
+          <p:nvPr/>
+        </p:nvSpPr>
+        <p:spPr>
+          <a:xfrm>
+            <a:off x="6153665" y="5246244"/>
+            <a:ext cx="5675870" cy="369332"/>
+          </a:xfrm>
+          <a:prstGeom prst="rect">
+            <a:avLst/>
+          </a:prstGeom>
+          <a:noFill/>
+        </p:spPr>
+        <p:txBody>
+          <a:bodyPr wrap="square" rtlCol="0">
+            <a:spAutoFit/>
+          </a:bodyPr>
+          <a:lstStyle/>
+          <a:p>
+            <a:pPr algn="r"/>
+            <a:r>
+              <a:rPr lang="en-US" b="1" dirty="0">
+                <a:solidFill>
+                  <a:schemeClr val="accent1"/>
+                </a:solidFill>
+                <a:hlinkClick r:id="rId4" action="ppaction://hlinksldjump"/>
+              </a:rPr>
+              <a:t>Background Information</a:t>
+            </a:r>
+            <a:endParaRPr lang="en-US" b="1" dirty="0">
+              <a:solidFill>
+                <a:schemeClr val="accent1"/>
+              </a:solidFill>
+            </a:endParaRPr>
+          </a:p>
+        </p:txBody>
+      </p:sp>
+      <p:sp>
+        <p:nvSpPr>
+          <p:cNvPr id="6" name="TextBox 5"/>
+          <p:cNvSpPr txBox="1"/>
+          <p:nvPr/>
+        </p:nvSpPr>
+        <p:spPr>
+          <a:xfrm>
+            <a:off x="4670854" y="4832837"/>
+            <a:ext cx="7158681" cy="369332"/>
+          </a:xfrm>
+          <a:prstGeom prst="rect">
+            <a:avLst/>
+          </a:prstGeom>
+          <a:noFill/>
+        </p:spPr>
+        <p:txBody>
+          <a:bodyPr wrap="square" rtlCol="0">
+            <a:spAutoFit/>
+          </a:bodyPr>
+          <a:lstStyle/>
+          <a:p>
+            <a:pPr algn="r"/>
+            <a:r>
+              <a:rPr lang="en-US" b="1" dirty="0">
+                <a:solidFill>
+                  <a:schemeClr val="accent1"/>
+                </a:solidFill>
+                <a:hlinkClick r:id="rId5" action="ppaction://hlinksldjump"/>
+              </a:rPr>
+              <a:t>Problem and Decision Statement</a:t>
+            </a:r>
+            <a:endParaRPr lang="en-US" b="1" dirty="0">
+              <a:solidFill>
+                <a:schemeClr val="accent1"/>
+              </a:solidFill>
+            </a:endParaRPr>
+          </a:p>
+        </p:txBody>
+      </p:sp>
+      <p:sp>
+        <p:nvSpPr>
+          <p:cNvPr id="7" name="TextBox 6"/>
+          <p:cNvSpPr txBox="1"/>
+          <p:nvPr/>
+        </p:nvSpPr>
+        <p:spPr>
+          <a:xfrm>
+            <a:off x="172994" y="6304627"/>
+            <a:ext cx="7158681" cy="369332"/>
+          </a:xfrm>
+          <a:prstGeom prst="rect">
+            <a:avLst/>
+          </a:prstGeom>
+          <a:noFill/>
+        </p:spPr>
+        <p:txBody>
+          <a:bodyPr wrap="square" rtlCol="0">
+            <a:spAutoFit/>
+          </a:bodyPr>
+          <a:lstStyle/>
+          <a:p>
+            <a:r>
+              <a:rPr lang="en-US" b="1" dirty="0">
+                <a:solidFill>
+                  <a:schemeClr val="accent1"/>
+                </a:solidFill>
+                <a:hlinkClick r:id="rId6" action="ppaction://hlinksldjump"/>
+              </a:rPr>
+              <a:t>Wascana Post Merger FCF Calculation</a:t>
+            </a:r>
+            <a:endParaRPr lang="en-US" b="1" dirty="0">
+              <a:solidFill>
+                <a:schemeClr val="accent1"/>
+              </a:solidFill>
+            </a:endParaRPr>
+          </a:p>
+        </p:txBody>
+      </p:sp>
+      <p:sp>
+        <p:nvSpPr>
+          <p:cNvPr id="8" name="TextBox 7"/>
+          <p:cNvSpPr txBox="1"/>
+          <p:nvPr/>
+        </p:nvSpPr>
+        <p:spPr>
+          <a:xfrm>
+            <a:off x="172993" y="5822327"/>
+            <a:ext cx="7158681" cy="369332"/>
+          </a:xfrm>
+          <a:prstGeom prst="rect">
+            <a:avLst/>
+          </a:prstGeom>
+          <a:noFill/>
+        </p:spPr>
+        <p:txBody>
+          <a:bodyPr wrap="square" rtlCol="0">
+            <a:spAutoFit/>
+          </a:bodyPr>
+          <a:lstStyle/>
+          <a:p>
+            <a:r>
+              <a:rPr lang="en-US" b="1" dirty="0">
+                <a:solidFill>
+                  <a:schemeClr val="accent1"/>
+                </a:solidFill>
+                <a:hlinkClick r:id="rId7" action="ppaction://hlinksldjump"/>
+              </a:rPr>
+              <a:t>Comparables Universe</a:t>
+            </a:r>
+            <a:endParaRPr lang="en-US" b="1" dirty="0">
+              <a:solidFill>
+                <a:schemeClr val="accent1"/>
+              </a:solidFill>
+            </a:endParaRPr>
+          </a:p>
+        </p:txBody>
+      </p:sp>
+      <p:sp>
+        <p:nvSpPr>
+          <p:cNvPr id="9" name="TextBox 8"/>
+          <p:cNvSpPr txBox="1"/>
+          <p:nvPr/>
+        </p:nvSpPr>
+        <p:spPr>
+          <a:xfrm>
+            <a:off x="172993" y="5450350"/>
+            <a:ext cx="7158681" cy="369332"/>
+          </a:xfrm>
+          <a:prstGeom prst="rect">
+            <a:avLst/>
+          </a:prstGeom>
+          <a:noFill/>
+        </p:spPr>
+        <p:txBody>
+          <a:bodyPr wrap="square" rtlCol="0">
+            <a:spAutoFit/>
+          </a:bodyPr>
+          <a:lstStyle/>
+          <a:p>
+            <a:r>
+              <a:rPr lang="en-US" b="1" dirty="0">
+                <a:solidFill>
+                  <a:schemeClr val="accent1"/>
+                </a:solidFill>
+                <a:hlinkClick r:id="rId8" action="ppaction://hlinksldjump"/>
+              </a:rPr>
+              <a:t>Actual and Projected Commodity Prices</a:t>
+            </a:r>
+            <a:endParaRPr lang="en-US" b="1" dirty="0">
+              <a:solidFill>
+                <a:schemeClr val="accent1"/>
+              </a:solidFill>
+            </a:endParaRPr>
+          </a:p>
+        </p:txBody>
+      </p:sp>
+      <p:sp>
+        <p:nvSpPr>
+          <p:cNvPr id="10" name="TextBox 9"/>
+          <p:cNvSpPr txBox="1"/>
+          <p:nvPr/>
+        </p:nvSpPr>
+        <p:spPr>
+          <a:xfrm>
+            <a:off x="172993" y="5061578"/>
+            <a:ext cx="7158681" cy="369332"/>
+          </a:xfrm>
+          <a:prstGeom prst="rect">
+            <a:avLst/>
+          </a:prstGeom>
+          <a:noFill/>
+        </p:spPr>
+        <p:txBody>
+          <a:bodyPr wrap="square" rtlCol="0">
+            <a:spAutoFit/>
+          </a:bodyPr>
+          <a:lstStyle/>
+          <a:p>
+            <a:r>
+              <a:rPr lang="en-US" b="1" dirty="0">
+                <a:solidFill>
+                  <a:schemeClr val="accent1"/>
+                </a:solidFill>
+                <a:hlinkClick r:id="rId9" action="ppaction://hlinksldjump"/>
+              </a:rPr>
+              <a:t>Selected Canadian Economic Data</a:t>
+            </a:r>
+            <a:endParaRPr lang="en-US" b="1" dirty="0">
+              <a:solidFill>
+                <a:schemeClr val="accent1"/>
+              </a:solidFill>
+            </a:endParaRPr>
           </a:p>
         </p:txBody>
       </p:sp>
@@ -14836,13 +15291,426 @@
       </p:transition>
     </mc:Fallback>
   </mc:AlternateContent>
-  <p:timing>
-    <p:tnLst>
-      <p:par>
-        <p:cTn id="1" dur="indefinite" restart="never" nodeType="tmRoot"/>
-      </p:par>
-    </p:tnLst>
-  </p:timing>
+</p:sld>
+</file>
+
+<file path=ppt/slides/slide23.xml><?xml version="1.0" encoding="utf-8"?>
+<p:sld xmlns:a="http://schemas.openxmlformats.org/drawingml/2006/main" xmlns:r="http://schemas.openxmlformats.org/officeDocument/2006/relationships" xmlns:p="http://schemas.openxmlformats.org/presentationml/2006/main">
+  <p:cSld>
+    <p:spTree>
+      <p:nvGrpSpPr>
+        <p:cNvPr id="1" name=""/>
+        <p:cNvGrpSpPr/>
+        <p:nvPr/>
+      </p:nvGrpSpPr>
+      <p:grpSpPr>
+        <a:xfrm>
+          <a:off x="0" y="0"/>
+          <a:ext cx="0" cy="0"/>
+          <a:chOff x="0" y="0"/>
+          <a:chExt cx="0" cy="0"/>
+        </a:xfrm>
+      </p:grpSpPr>
+      <p:pic>
+        <p:nvPicPr>
+          <p:cNvPr id="5" name="Picture 4"/>
+          <p:cNvPicPr>
+            <a:picLocks noChangeAspect="1"/>
+          </p:cNvPicPr>
+          <p:nvPr/>
+        </p:nvPicPr>
+        <p:blipFill>
+          <a:blip r:embed="rId2"/>
+          <a:stretch>
+            <a:fillRect/>
+          </a:stretch>
+        </p:blipFill>
+        <p:spPr>
+          <a:xfrm>
+            <a:off x="288693" y="199276"/>
+            <a:ext cx="10988907" cy="4974099"/>
+          </a:xfrm>
+          <a:prstGeom prst="rect">
+            <a:avLst/>
+          </a:prstGeom>
+        </p:spPr>
+      </p:pic>
+      <p:sp>
+        <p:nvSpPr>
+          <p:cNvPr id="6" name="TextBox 5"/>
+          <p:cNvSpPr txBox="1"/>
+          <p:nvPr/>
+        </p:nvSpPr>
+        <p:spPr>
+          <a:xfrm>
+            <a:off x="111210" y="6275529"/>
+            <a:ext cx="7158681" cy="369332"/>
+          </a:xfrm>
+          <a:prstGeom prst="rect">
+            <a:avLst/>
+          </a:prstGeom>
+          <a:noFill/>
+        </p:spPr>
+        <p:txBody>
+          <a:bodyPr wrap="square" rtlCol="0">
+            <a:spAutoFit/>
+          </a:bodyPr>
+          <a:lstStyle/>
+          <a:p>
+            <a:r>
+              <a:rPr lang="en-US" b="1" dirty="0">
+                <a:solidFill>
+                  <a:schemeClr val="accent1"/>
+                </a:solidFill>
+                <a:hlinkClick r:id="rId3" action="ppaction://hlinksldjump"/>
+              </a:rPr>
+              <a:t>QA</a:t>
+            </a:r>
+            <a:endParaRPr lang="en-US" b="1" dirty="0">
+              <a:solidFill>
+                <a:schemeClr val="accent1"/>
+              </a:solidFill>
+            </a:endParaRPr>
+          </a:p>
+        </p:txBody>
+      </p:sp>
+    </p:spTree>
+    <p:extLst>
+      <p:ext uri="{BB962C8B-B14F-4D97-AF65-F5344CB8AC3E}">
+        <p14:creationId xmlns:p14="http://schemas.microsoft.com/office/powerpoint/2010/main" val="458944404"/>
+      </p:ext>
+    </p:extLst>
+  </p:cSld>
+  <p:clrMapOvr>
+    <a:masterClrMapping/>
+  </p:clrMapOvr>
+  <mc:AlternateContent xmlns:mc="http://schemas.openxmlformats.org/markup-compatibility/2006" xmlns:p14="http://schemas.microsoft.com/office/powerpoint/2010/main">
+    <mc:Choice Requires="p14">
+      <p:transition spd="med" p14:dur="700">
+        <p:fade/>
+      </p:transition>
+    </mc:Choice>
+    <mc:Fallback xmlns="">
+      <p:transition spd="med">
+        <p:fade/>
+      </p:transition>
+    </mc:Fallback>
+  </mc:AlternateContent>
+</p:sld>
+</file>
+
+<file path=ppt/slides/slide24.xml><?xml version="1.0" encoding="utf-8"?>
+<p:sld xmlns:a="http://schemas.openxmlformats.org/drawingml/2006/main" xmlns:r="http://schemas.openxmlformats.org/officeDocument/2006/relationships" xmlns:p="http://schemas.openxmlformats.org/presentationml/2006/main">
+  <p:cSld>
+    <p:spTree>
+      <p:nvGrpSpPr>
+        <p:cNvPr id="1" name=""/>
+        <p:cNvGrpSpPr/>
+        <p:nvPr/>
+      </p:nvGrpSpPr>
+      <p:grpSpPr>
+        <a:xfrm>
+          <a:off x="0" y="0"/>
+          <a:ext cx="0" cy="0"/>
+          <a:chOff x="0" y="0"/>
+          <a:chExt cx="0" cy="0"/>
+        </a:xfrm>
+      </p:grpSpPr>
+      <p:pic>
+        <p:nvPicPr>
+          <p:cNvPr id="4" name="Picture 3"/>
+          <p:cNvPicPr>
+            <a:picLocks noChangeAspect="1"/>
+          </p:cNvPicPr>
+          <p:nvPr/>
+        </p:nvPicPr>
+        <p:blipFill>
+          <a:blip r:embed="rId2"/>
+          <a:stretch>
+            <a:fillRect/>
+          </a:stretch>
+        </p:blipFill>
+        <p:spPr>
+          <a:xfrm>
+            <a:off x="352220" y="0"/>
+            <a:ext cx="10371575" cy="4985555"/>
+          </a:xfrm>
+          <a:prstGeom prst="rect">
+            <a:avLst/>
+          </a:prstGeom>
+        </p:spPr>
+      </p:pic>
+      <p:sp>
+        <p:nvSpPr>
+          <p:cNvPr id="5" name="TextBox 4"/>
+          <p:cNvSpPr txBox="1"/>
+          <p:nvPr/>
+        </p:nvSpPr>
+        <p:spPr>
+          <a:xfrm>
+            <a:off x="111210" y="6275529"/>
+            <a:ext cx="7158681" cy="369332"/>
+          </a:xfrm>
+          <a:prstGeom prst="rect">
+            <a:avLst/>
+          </a:prstGeom>
+          <a:noFill/>
+        </p:spPr>
+        <p:txBody>
+          <a:bodyPr wrap="square" rtlCol="0">
+            <a:spAutoFit/>
+          </a:bodyPr>
+          <a:lstStyle/>
+          <a:p>
+            <a:r>
+              <a:rPr lang="en-US" b="1" dirty="0">
+                <a:solidFill>
+                  <a:schemeClr val="accent1"/>
+                </a:solidFill>
+                <a:hlinkClick r:id="rId3" action="ppaction://hlinksldjump"/>
+              </a:rPr>
+              <a:t>QA</a:t>
+            </a:r>
+            <a:endParaRPr lang="en-US" b="1" dirty="0">
+              <a:solidFill>
+                <a:schemeClr val="accent1"/>
+              </a:solidFill>
+            </a:endParaRPr>
+          </a:p>
+        </p:txBody>
+      </p:sp>
+    </p:spTree>
+    <p:extLst>
+      <p:ext uri="{BB962C8B-B14F-4D97-AF65-F5344CB8AC3E}">
+        <p14:creationId xmlns:p14="http://schemas.microsoft.com/office/powerpoint/2010/main" val="3698674274"/>
+      </p:ext>
+    </p:extLst>
+  </p:cSld>
+  <p:clrMapOvr>
+    <a:masterClrMapping/>
+  </p:clrMapOvr>
+  <mc:AlternateContent xmlns:mc="http://schemas.openxmlformats.org/markup-compatibility/2006" xmlns:p14="http://schemas.microsoft.com/office/powerpoint/2010/main">
+    <mc:Choice Requires="p14">
+      <p:transition spd="med" p14:dur="700">
+        <p:fade/>
+      </p:transition>
+    </mc:Choice>
+    <mc:Fallback xmlns="">
+      <p:transition spd="med">
+        <p:fade/>
+      </p:transition>
+    </mc:Fallback>
+  </mc:AlternateContent>
+</p:sld>
+</file>
+
+<file path=ppt/slides/slide25.xml><?xml version="1.0" encoding="utf-8"?>
+<p:sld xmlns:a="http://schemas.openxmlformats.org/drawingml/2006/main" xmlns:r="http://schemas.openxmlformats.org/officeDocument/2006/relationships" xmlns:p="http://schemas.openxmlformats.org/presentationml/2006/main">
+  <p:cSld>
+    <p:spTree>
+      <p:nvGrpSpPr>
+        <p:cNvPr id="1" name=""/>
+        <p:cNvGrpSpPr/>
+        <p:nvPr/>
+      </p:nvGrpSpPr>
+      <p:grpSpPr>
+        <a:xfrm>
+          <a:off x="0" y="0"/>
+          <a:ext cx="0" cy="0"/>
+          <a:chOff x="0" y="0"/>
+          <a:chExt cx="0" cy="0"/>
+        </a:xfrm>
+      </p:grpSpPr>
+      <p:pic>
+        <p:nvPicPr>
+          <p:cNvPr id="4" name="Picture 3"/>
+          <p:cNvPicPr>
+            <a:picLocks noChangeAspect="1"/>
+          </p:cNvPicPr>
+          <p:nvPr/>
+        </p:nvPicPr>
+        <p:blipFill>
+          <a:blip r:embed="rId2"/>
+          <a:stretch>
+            <a:fillRect/>
+          </a:stretch>
+        </p:blipFill>
+        <p:spPr>
+          <a:xfrm>
+            <a:off x="331082" y="449190"/>
+            <a:ext cx="11313013" cy="4170936"/>
+          </a:xfrm>
+          <a:prstGeom prst="rect">
+            <a:avLst/>
+          </a:prstGeom>
+        </p:spPr>
+      </p:pic>
+      <p:sp>
+        <p:nvSpPr>
+          <p:cNvPr id="5" name="TextBox 4"/>
+          <p:cNvSpPr txBox="1"/>
+          <p:nvPr/>
+        </p:nvSpPr>
+        <p:spPr>
+          <a:xfrm>
+            <a:off x="111210" y="6275529"/>
+            <a:ext cx="7158681" cy="369332"/>
+          </a:xfrm>
+          <a:prstGeom prst="rect">
+            <a:avLst/>
+          </a:prstGeom>
+          <a:noFill/>
+        </p:spPr>
+        <p:txBody>
+          <a:bodyPr wrap="square" rtlCol="0">
+            <a:spAutoFit/>
+          </a:bodyPr>
+          <a:lstStyle/>
+          <a:p>
+            <a:r>
+              <a:rPr lang="en-US" b="1" dirty="0">
+                <a:solidFill>
+                  <a:schemeClr val="accent1"/>
+                </a:solidFill>
+                <a:hlinkClick r:id="rId3" action="ppaction://hlinksldjump"/>
+              </a:rPr>
+              <a:t>QA</a:t>
+            </a:r>
+            <a:endParaRPr lang="en-US" b="1" dirty="0">
+              <a:solidFill>
+                <a:schemeClr val="accent1"/>
+              </a:solidFill>
+            </a:endParaRPr>
+          </a:p>
+        </p:txBody>
+      </p:sp>
+    </p:spTree>
+    <p:extLst>
+      <p:ext uri="{BB962C8B-B14F-4D97-AF65-F5344CB8AC3E}">
+        <p14:creationId xmlns:p14="http://schemas.microsoft.com/office/powerpoint/2010/main" val="3905006035"/>
+      </p:ext>
+    </p:extLst>
+  </p:cSld>
+  <p:clrMapOvr>
+    <a:masterClrMapping/>
+  </p:clrMapOvr>
+  <mc:AlternateContent xmlns:mc="http://schemas.openxmlformats.org/markup-compatibility/2006" xmlns:p14="http://schemas.microsoft.com/office/powerpoint/2010/main">
+    <mc:Choice Requires="p14">
+      <p:transition spd="med" p14:dur="700">
+        <p:fade/>
+      </p:transition>
+    </mc:Choice>
+    <mc:Fallback xmlns="">
+      <p:transition spd="med">
+        <p:fade/>
+      </p:transition>
+    </mc:Fallback>
+  </mc:AlternateContent>
+</p:sld>
+</file>
+
+<file path=ppt/slides/slide26.xml><?xml version="1.0" encoding="utf-8"?>
+<p:sld xmlns:a="http://schemas.openxmlformats.org/drawingml/2006/main" xmlns:r="http://schemas.openxmlformats.org/officeDocument/2006/relationships" xmlns:p="http://schemas.openxmlformats.org/presentationml/2006/main">
+  <p:cSld>
+    <p:spTree>
+      <p:nvGrpSpPr>
+        <p:cNvPr id="1" name=""/>
+        <p:cNvGrpSpPr/>
+        <p:nvPr/>
+      </p:nvGrpSpPr>
+      <p:grpSpPr>
+        <a:xfrm>
+          <a:off x="0" y="0"/>
+          <a:ext cx="0" cy="0"/>
+          <a:chOff x="0" y="0"/>
+          <a:chExt cx="0" cy="0"/>
+        </a:xfrm>
+      </p:grpSpPr>
+      <p:pic>
+        <p:nvPicPr>
+          <p:cNvPr id="2" name="Picture 1"/>
+          <p:cNvPicPr>
+            <a:picLocks noChangeAspect="1"/>
+          </p:cNvPicPr>
+          <p:nvPr/>
+        </p:nvPicPr>
+        <p:blipFill>
+          <a:blip r:embed="rId2"/>
+          <a:stretch>
+            <a:fillRect/>
+          </a:stretch>
+        </p:blipFill>
+        <p:spPr>
+          <a:xfrm>
+            <a:off x="2335579" y="258348"/>
+            <a:ext cx="9351593" cy="6188903"/>
+          </a:xfrm>
+          <a:prstGeom prst="rect">
+            <a:avLst/>
+          </a:prstGeom>
+        </p:spPr>
+      </p:pic>
+      <p:sp>
+        <p:nvSpPr>
+          <p:cNvPr id="3" name="TextBox 2"/>
+          <p:cNvSpPr txBox="1"/>
+          <p:nvPr/>
+        </p:nvSpPr>
+        <p:spPr>
+          <a:xfrm>
+            <a:off x="111210" y="6275529"/>
+            <a:ext cx="7158681" cy="369332"/>
+          </a:xfrm>
+          <a:prstGeom prst="rect">
+            <a:avLst/>
+          </a:prstGeom>
+          <a:noFill/>
+        </p:spPr>
+        <p:txBody>
+          <a:bodyPr wrap="square" rtlCol="0">
+            <a:spAutoFit/>
+          </a:bodyPr>
+          <a:lstStyle/>
+          <a:p>
+            <a:r>
+              <a:rPr lang="en-US" b="1" dirty="0">
+                <a:solidFill>
+                  <a:schemeClr val="accent1"/>
+                </a:solidFill>
+                <a:hlinkClick r:id="rId3" action="ppaction://hlinksldjump"/>
+              </a:rPr>
+              <a:t>QA</a:t>
+            </a:r>
+            <a:endParaRPr lang="en-US" b="1" dirty="0">
+              <a:solidFill>
+                <a:schemeClr val="accent1"/>
+              </a:solidFill>
+            </a:endParaRPr>
+          </a:p>
+        </p:txBody>
+      </p:sp>
+    </p:spTree>
+    <p:extLst>
+      <p:ext uri="{BB962C8B-B14F-4D97-AF65-F5344CB8AC3E}">
+        <p14:creationId xmlns:p14="http://schemas.microsoft.com/office/powerpoint/2010/main" val="670203317"/>
+      </p:ext>
+    </p:extLst>
+  </p:cSld>
+  <p:clrMapOvr>
+    <a:masterClrMapping/>
+  </p:clrMapOvr>
+  <mc:AlternateContent xmlns:mc="http://schemas.openxmlformats.org/markup-compatibility/2006" xmlns:p14="http://schemas.microsoft.com/office/powerpoint/2010/main">
+    <mc:Choice Requires="p14">
+      <p:transition spd="med" p14:dur="700">
+        <p:fade/>
+      </p:transition>
+    </mc:Choice>
+    <mc:Fallback xmlns="">
+      <p:transition spd="med">
+        <p:fade/>
+      </p:transition>
+    </mc:Fallback>
+  </mc:AlternateContent>
 </p:sld>
 </file>
 
@@ -15012,20 +15880,12 @@
           </a:p>
           <a:p>
             <a:r>
-              <a:rPr lang="en-US" sz="4000" b="1" dirty="0" err="1">
+              <a:rPr lang="en-US" sz="4000" b="1" dirty="0">
                 <a:solidFill>
                   <a:schemeClr val="accent1"/>
                 </a:solidFill>
               </a:rPr>
-              <a:t>Wascana</a:t>
-            </a:r>
-            <a:r>
-              <a:rPr lang="en-US" sz="4000" b="1" dirty="0">
-                <a:solidFill>
-                  <a:schemeClr val="accent1"/>
-                </a:solidFill>
-              </a:rPr>
-              <a:t> Energy Inc. </a:t>
+              <a:t>Wascana Energy Inc. </a:t>
             </a:r>
           </a:p>
         </p:txBody>
@@ -15052,13 +15912,6 @@
       </p:transition>
     </mc:Fallback>
   </mc:AlternateContent>
-  <p:timing>
-    <p:tnLst>
-      <p:par>
-        <p:cTn id="1" dur="indefinite" restart="never" nodeType="tmRoot"/>
-      </p:par>
-    </p:tnLst>
-  </p:timing>
 </p:sld>
 </file>
 
@@ -15149,20 +16002,12 @@
           <a:lstStyle/>
           <a:p>
             <a:r>
-              <a:rPr lang="en-US" sz="6600" b="1" dirty="0" err="1">
+              <a:rPr lang="en-US" sz="6600" b="1" dirty="0">
                 <a:solidFill>
                   <a:schemeClr val="accent1"/>
                 </a:solidFill>
               </a:rPr>
-              <a:t>Wascana</a:t>
-            </a:r>
-            <a:r>
-              <a:rPr lang="en-US" sz="6600" b="1" dirty="0">
-                <a:solidFill>
-                  <a:schemeClr val="accent1"/>
-                </a:solidFill>
-              </a:rPr>
-              <a:t> Energy Inc.</a:t>
+              <a:t>Wascana Energy Inc.</a:t>
             </a:r>
           </a:p>
           <a:p>
@@ -15276,24 +16121,14 @@
           </a:p>
           <a:p>
             <a:r>
-              <a:rPr lang="en-US" sz="3200" b="1" dirty="0" err="1">
+              <a:rPr lang="en-US" sz="3200" b="1" dirty="0">
                 <a:solidFill>
                   <a:schemeClr val="tx2">
                     <a:lumMod val="75000"/>
                   </a:schemeClr>
                 </a:solidFill>
               </a:rPr>
-              <a:t>Comparables</a:t>
-            </a:r>
-            <a:r>
-              <a:rPr lang="en-US" sz="3200" b="1" dirty="0">
-                <a:solidFill>
-                  <a:schemeClr val="tx2">
-                    <a:lumMod val="75000"/>
-                  </a:schemeClr>
-                </a:solidFill>
-              </a:rPr>
-              <a:t> Method</a:t>
+              <a:t>Comparables Method</a:t>
             </a:r>
           </a:p>
           <a:p>
@@ -15389,13 +16224,6 @@
       </p:transition>
     </mc:Fallback>
   </mc:AlternateContent>
-  <p:timing>
-    <p:tnLst>
-      <p:par>
-        <p:cTn id="1" dur="indefinite" restart="never" nodeType="tmRoot"/>
-      </p:par>
-    </p:tnLst>
-  </p:timing>
 </p:sld>
 </file>
 
@@ -15454,6 +16282,45 @@
           </a:p>
         </p:txBody>
       </p:sp>
+      <p:sp>
+        <p:nvSpPr>
+          <p:cNvPr id="3" name="TextBox 2"/>
+          <p:cNvSpPr txBox="1"/>
+          <p:nvPr/>
+        </p:nvSpPr>
+        <p:spPr>
+          <a:xfrm>
+            <a:off x="111210" y="6275529"/>
+            <a:ext cx="7158681" cy="369332"/>
+          </a:xfrm>
+          <a:prstGeom prst="rect">
+            <a:avLst/>
+          </a:prstGeom>
+          <a:noFill/>
+        </p:spPr>
+        <p:txBody>
+          <a:bodyPr wrap="square" rtlCol="0">
+            <a:spAutoFit/>
+          </a:bodyPr>
+          <a:lstStyle/>
+          <a:p>
+            <a:r>
+              <a:rPr lang="en-US" b="1" dirty="0">
+                <a:solidFill>
+                  <a:schemeClr val="accent1"/>
+                </a:solidFill>
+                <a:hlinkClick r:id="rId2" action="ppaction://hlinksldjump"/>
+              </a:rPr>
+              <a:t>QA</a:t>
+            </a:r>
+            <a:endParaRPr lang="en-US" b="1" dirty="0">
+              <a:solidFill>
+                <a:schemeClr val="accent1"/>
+              </a:solidFill>
+            </a:endParaRPr>
+          </a:p>
+        </p:txBody>
+      </p:sp>
     </p:spTree>
     <p:extLst>
       <p:ext uri="{BB962C8B-B14F-4D97-AF65-F5344CB8AC3E}">
@@ -15476,13 +16343,6 @@
       </p:transition>
     </mc:Fallback>
   </mc:AlternateContent>
-  <p:timing>
-    <p:tnLst>
-      <p:par>
-        <p:cTn id="1" dur="indefinite" restart="never" nodeType="tmRoot"/>
-      </p:par>
-    </p:tnLst>
-  </p:timing>
 </p:sld>
 </file>
 
@@ -15531,23 +16391,7 @@
                   <a:schemeClr val="tx2"/>
                 </a:solidFill>
               </a:rPr>
-              <a:t>Target:       </a:t>
-            </a:r>
-            <a:r>
-              <a:rPr lang="en-US" sz="3200" b="1" dirty="0" err="1">
-                <a:solidFill>
-                  <a:schemeClr val="tx2"/>
-                </a:solidFill>
-              </a:rPr>
-              <a:t>Wascana</a:t>
-            </a:r>
-            <a:r>
-              <a:rPr lang="en-US" sz="3200" b="1" dirty="0">
-                <a:solidFill>
-                  <a:schemeClr val="tx2"/>
-                </a:solidFill>
-              </a:rPr>
-              <a:t> Energy</a:t>
+              <a:t>Target:       Wascana Energy</a:t>
             </a:r>
           </a:p>
           <a:p>
@@ -15636,13 +16480,6 @@
       </p:transition>
     </mc:Fallback>
   </mc:AlternateContent>
-  <p:timing>
-    <p:tnLst>
-      <p:par>
-        <p:cTn id="1" dur="indefinite" restart="never" nodeType="tmRoot"/>
-      </p:par>
-    </p:tnLst>
-  </p:timing>
 </p:sld>
 </file>
 
@@ -15698,23 +16535,7 @@
                   <a:schemeClr val="tx2"/>
                 </a:solidFill>
               </a:rPr>
-              <a:t>Target:       </a:t>
-            </a:r>
-            <a:r>
-              <a:rPr lang="en-US" sz="3200" b="1" dirty="0" err="1">
-                <a:solidFill>
-                  <a:schemeClr val="tx2"/>
-                </a:solidFill>
-              </a:rPr>
-              <a:t>Wascana</a:t>
-            </a:r>
-            <a:r>
-              <a:rPr lang="en-US" sz="3200" b="1" dirty="0">
-                <a:solidFill>
-                  <a:schemeClr val="tx2"/>
-                </a:solidFill>
-              </a:rPr>
-              <a:t> Energy</a:t>
+              <a:t>Target:       Wascana Energy</a:t>
             </a:r>
           </a:p>
           <a:p>
@@ -15803,7 +16624,7 @@
             <a:p>
               <a:pPr algn="ctr"/>
               <a:r>
-                <a:rPr lang="en-US" sz="2800" b="1" dirty="0" smtClean="0"/>
+                <a:rPr lang="en-US" sz="2800" b="1" dirty="0"/>
                 <a:t>Efficiencies</a:t>
               </a:r>
               <a:endParaRPr lang="en-US" b="1" dirty="0"/>
@@ -16020,13 +16841,6 @@
       </p:transition>
     </mc:Fallback>
   </mc:AlternateContent>
-  <p:timing>
-    <p:tnLst>
-      <p:par>
-        <p:cTn id="1" dur="indefinite" restart="never" nodeType="tmRoot"/>
-      </p:par>
-    </p:tnLst>
-  </p:timing>
 </p:sld>
 </file>
 
@@ -16089,23 +16903,7 @@
                   <a:schemeClr val="tx2"/>
                 </a:solidFill>
               </a:rPr>
-              <a:t>Target:       </a:t>
-            </a:r>
-            <a:r>
-              <a:rPr lang="en-US" sz="3200" b="1" dirty="0" err="1">
-                <a:solidFill>
-                  <a:schemeClr val="tx2"/>
-                </a:solidFill>
-              </a:rPr>
-              <a:t>Wascana</a:t>
-            </a:r>
-            <a:r>
-              <a:rPr lang="en-US" sz="3200" b="1" dirty="0">
-                <a:solidFill>
-                  <a:schemeClr val="tx2"/>
-                </a:solidFill>
-              </a:rPr>
-              <a:t> Energy</a:t>
+              <a:t>Target:       Wascana Energy</a:t>
             </a:r>
           </a:p>
           <a:p>
@@ -16426,13 +17224,6 @@
       </p:transition>
     </mc:Fallback>
   </mc:AlternateContent>
-  <p:timing>
-    <p:tnLst>
-      <p:par>
-        <p:cTn id="1" dur="indefinite" restart="never" nodeType="tmRoot"/>
-      </p:par>
-    </p:tnLst>
-  </p:timing>
 </p:sld>
 </file>
 
@@ -16502,23 +17293,7 @@
                   <a:schemeClr val="accent1"/>
                 </a:solidFill>
               </a:rPr>
-              <a:t>Target:       </a:t>
-            </a:r>
-            <a:r>
-              <a:rPr lang="en-US" sz="3200" b="1" dirty="0" err="1">
-                <a:solidFill>
-                  <a:schemeClr val="accent1"/>
-                </a:solidFill>
-              </a:rPr>
-              <a:t>Wascana</a:t>
-            </a:r>
-            <a:r>
-              <a:rPr lang="en-US" sz="3200" b="1" dirty="0">
-                <a:solidFill>
-                  <a:schemeClr val="accent1"/>
-                </a:solidFill>
-              </a:rPr>
-              <a:t> Energy</a:t>
+              <a:t>Target:       Wascana Energy</a:t>
             </a:r>
           </a:p>
           <a:p>
@@ -16555,20 +17330,12 @@
           <a:lstStyle/>
           <a:p>
             <a:r>
-              <a:rPr lang="en-US" sz="4000" b="1" dirty="0" err="1">
+              <a:rPr lang="en-US" sz="4000" b="1" dirty="0">
                 <a:solidFill>
                   <a:schemeClr val="accent1"/>
                 </a:solidFill>
               </a:rPr>
-              <a:t>Wascana</a:t>
-            </a:r>
-            <a:r>
-              <a:rPr lang="en-US" sz="4000" b="1" dirty="0">
-                <a:solidFill>
-                  <a:schemeClr val="accent1"/>
-                </a:solidFill>
-              </a:rPr>
-              <a:t> Energy Inc. </a:t>
+              <a:t>Wascana Energy Inc. </a:t>
             </a:r>
           </a:p>
           <a:p>
@@ -16805,13 +17572,6 @@
       </p:transition>
     </mc:Fallback>
   </mc:AlternateContent>
-  <p:timing>
-    <p:tnLst>
-      <p:par>
-        <p:cTn id="1" dur="indefinite" restart="never" nodeType="tmRoot"/>
-      </p:par>
-    </p:tnLst>
-  </p:timing>
 </p:sld>
 </file>
 
@@ -17104,7 +17864,7 @@
   <a:extraClrSchemeLst/>
   <a:extLst>
     <a:ext uri="{05A4C25C-085E-4340-85A3-A5531E510DB2}">
-      <thm15:themeFamily xmlns="" xmlns:thm15="http://schemas.microsoft.com/office/thememl/2012/main" name="Office Theme" id="{62F939B6-93AF-4DB8-9C6B-D6C7DFDC589F}" vid="{4A3C46E8-61CC-4603-A589-7422A47A8E4A}"/>
+      <thm15:themeFamily xmlns:thm15="http://schemas.microsoft.com/office/thememl/2012/main" name="Office Theme" id="{62F939B6-93AF-4DB8-9C6B-D6C7DFDC589F}" vid="{4A3C46E8-61CC-4603-A589-7422A47A8E4A}"/>
     </a:ext>
   </a:extLst>
 </a:theme>

</xml_diff>